<commit_message>
add my final zqy-E
</commit_message>
<xml_diff>
--- a/ppt/zqy-E.pptx
+++ b/ppt/zqy-E.pptx
@@ -288,7 +288,7 @@
           <a:p>
             <a:fld id="{E1F6CAF2-2A68-4A1D-996B-C11553C0E84B}" type="datetimeFigureOut">
               <a:rPr lang="zh-CN" altLang="en-US" smtClean="0"/>
-              <a:t>2021/12/29</a:t>
+              <a:t>2021/12/30</a:t>
             </a:fld>
             <a:endParaRPr lang="zh-CN" altLang="en-US"/>
           </a:p>
@@ -458,7 +458,7 @@
           <a:p>
             <a:fld id="{E1F6CAF2-2A68-4A1D-996B-C11553C0E84B}" type="datetimeFigureOut">
               <a:rPr lang="zh-CN" altLang="en-US" smtClean="0"/>
-              <a:t>2021/12/29</a:t>
+              <a:t>2021/12/30</a:t>
             </a:fld>
             <a:endParaRPr lang="zh-CN" altLang="en-US"/>
           </a:p>
@@ -638,7 +638,7 @@
           <a:p>
             <a:fld id="{E1F6CAF2-2A68-4A1D-996B-C11553C0E84B}" type="datetimeFigureOut">
               <a:rPr lang="zh-CN" altLang="en-US" smtClean="0"/>
-              <a:t>2021/12/29</a:t>
+              <a:t>2021/12/30</a:t>
             </a:fld>
             <a:endParaRPr lang="zh-CN" altLang="en-US"/>
           </a:p>
@@ -808,7 +808,7 @@
           <a:p>
             <a:fld id="{E1F6CAF2-2A68-4A1D-996B-C11553C0E84B}" type="datetimeFigureOut">
               <a:rPr lang="zh-CN" altLang="en-US" smtClean="0"/>
-              <a:t>2021/12/29</a:t>
+              <a:t>2021/12/30</a:t>
             </a:fld>
             <a:endParaRPr lang="zh-CN" altLang="en-US"/>
           </a:p>
@@ -1054,7 +1054,7 @@
           <a:p>
             <a:fld id="{E1F6CAF2-2A68-4A1D-996B-C11553C0E84B}" type="datetimeFigureOut">
               <a:rPr lang="zh-CN" altLang="en-US" smtClean="0"/>
-              <a:t>2021/12/29</a:t>
+              <a:t>2021/12/30</a:t>
             </a:fld>
             <a:endParaRPr lang="zh-CN" altLang="en-US"/>
           </a:p>
@@ -1342,7 +1342,7 @@
           <a:p>
             <a:fld id="{E1F6CAF2-2A68-4A1D-996B-C11553C0E84B}" type="datetimeFigureOut">
               <a:rPr lang="zh-CN" altLang="en-US" smtClean="0"/>
-              <a:t>2021/12/29</a:t>
+              <a:t>2021/12/30</a:t>
             </a:fld>
             <a:endParaRPr lang="zh-CN" altLang="en-US"/>
           </a:p>
@@ -1764,7 +1764,7 @@
           <a:p>
             <a:fld id="{E1F6CAF2-2A68-4A1D-996B-C11553C0E84B}" type="datetimeFigureOut">
               <a:rPr lang="zh-CN" altLang="en-US" smtClean="0"/>
-              <a:t>2021/12/29</a:t>
+              <a:t>2021/12/30</a:t>
             </a:fld>
             <a:endParaRPr lang="zh-CN" altLang="en-US"/>
           </a:p>
@@ -1882,7 +1882,7 @@
           <a:p>
             <a:fld id="{E1F6CAF2-2A68-4A1D-996B-C11553C0E84B}" type="datetimeFigureOut">
               <a:rPr lang="zh-CN" altLang="en-US" smtClean="0"/>
-              <a:t>2021/12/29</a:t>
+              <a:t>2021/12/30</a:t>
             </a:fld>
             <a:endParaRPr lang="zh-CN" altLang="en-US"/>
           </a:p>
@@ -1977,7 +1977,7 @@
           <a:p>
             <a:fld id="{E1F6CAF2-2A68-4A1D-996B-C11553C0E84B}" type="datetimeFigureOut">
               <a:rPr lang="zh-CN" altLang="en-US" smtClean="0"/>
-              <a:t>2021/12/29</a:t>
+              <a:t>2021/12/30</a:t>
             </a:fld>
             <a:endParaRPr lang="zh-CN" altLang="en-US"/>
           </a:p>
@@ -2254,7 +2254,7 @@
           <a:p>
             <a:fld id="{E1F6CAF2-2A68-4A1D-996B-C11553C0E84B}" type="datetimeFigureOut">
               <a:rPr lang="zh-CN" altLang="en-US" smtClean="0"/>
-              <a:t>2021/12/29</a:t>
+              <a:t>2021/12/30</a:t>
             </a:fld>
             <a:endParaRPr lang="zh-CN" altLang="en-US"/>
           </a:p>
@@ -2507,7 +2507,7 @@
           <a:p>
             <a:fld id="{E1F6CAF2-2A68-4A1D-996B-C11553C0E84B}" type="datetimeFigureOut">
               <a:rPr lang="zh-CN" altLang="en-US" smtClean="0"/>
-              <a:t>2021/12/29</a:t>
+              <a:t>2021/12/30</a:t>
             </a:fld>
             <a:endParaRPr lang="zh-CN" altLang="en-US"/>
           </a:p>
@@ -2720,7 +2720,7 @@
           <a:p>
             <a:fld id="{E1F6CAF2-2A68-4A1D-996B-C11553C0E84B}" type="datetimeFigureOut">
               <a:rPr lang="zh-CN" altLang="en-US" smtClean="0"/>
-              <a:t>2021/12/29</a:t>
+              <a:t>2021/12/30</a:t>
             </a:fld>
             <a:endParaRPr lang="zh-CN" altLang="en-US"/>
           </a:p>
@@ -3996,8 +3996,8 @@
         </p:nvSpPr>
         <p:spPr>
           <a:xfrm>
-            <a:off x="1036066" y="-1539552"/>
-            <a:ext cx="6131999" cy="8710077"/>
+            <a:off x="267082" y="181956"/>
+            <a:ext cx="3956852" cy="8710077"/>
           </a:xfrm>
           <a:prstGeom prst="rect">
             <a:avLst/>
@@ -4038,7 +4038,7 @@
                   </a:innerShdw>
                 </a:effectLst>
               </a:rPr>
-              <a:t>Let’s translate</a:t>
+              <a:t>translate</a:t>
             </a:r>
           </a:p>
           <a:p>
@@ -4626,6 +4626,1288 @@
           </a:extLst>
         </p:spPr>
       </p:pic>
+      <p:sp>
+        <p:nvSpPr>
+          <p:cNvPr id="2" name="矩形 1"/>
+          <p:cNvSpPr/>
+          <p:nvPr/>
+        </p:nvSpPr>
+        <p:spPr>
+          <a:xfrm>
+            <a:off x="2438634" y="3229224"/>
+            <a:ext cx="4358887" cy="923330"/>
+          </a:xfrm>
+          <a:prstGeom prst="rect">
+            <a:avLst/>
+          </a:prstGeom>
+          <a:noFill/>
+        </p:spPr>
+        <p:txBody>
+          <a:bodyPr wrap="none" lIns="91440" tIns="45720" rIns="91440" bIns="45720">
+            <a:spAutoFit/>
+            <a:scene3d>
+              <a:camera prst="orthographicFront"/>
+              <a:lightRig rig="glow" dir="tl">
+                <a:rot lat="0" lon="0" rev="5400000"/>
+              </a:lightRig>
+            </a:scene3d>
+            <a:sp3d contourW="12700">
+              <a:bevelT w="25400" h="25400"/>
+              <a:contourClr>
+                <a:schemeClr val="accent6">
+                  <a:shade val="73000"/>
+                </a:schemeClr>
+              </a:contourClr>
+            </a:sp3d>
+          </a:bodyPr>
+          <a:lstStyle/>
+          <a:p>
+            <a:pPr algn="ctr"/>
+            <a:r>
+              <a:rPr lang="zh-CN" altLang="en-US" sz="5400" b="1" dirty="0" smtClean="0">
+                <a:ln w="11430"/>
+                <a:gradFill>
+                  <a:gsLst>
+                    <a:gs pos="0">
+                      <a:schemeClr val="accent6">
+                        <a:tint val="90000"/>
+                        <a:satMod val="120000"/>
+                      </a:schemeClr>
+                    </a:gs>
+                    <a:gs pos="25000">
+                      <a:schemeClr val="accent6">
+                        <a:tint val="93000"/>
+                        <a:satMod val="120000"/>
+                      </a:schemeClr>
+                    </a:gs>
+                    <a:gs pos="50000">
+                      <a:schemeClr val="accent6">
+                        <a:shade val="89000"/>
+                        <a:satMod val="110000"/>
+                      </a:schemeClr>
+                    </a:gs>
+                    <a:gs pos="75000">
+                      <a:schemeClr val="accent6">
+                        <a:tint val="93000"/>
+                        <a:satMod val="120000"/>
+                      </a:schemeClr>
+                    </a:gs>
+                    <a:gs pos="100000">
+                      <a:schemeClr val="accent6">
+                        <a:tint val="90000"/>
+                        <a:satMod val="120000"/>
+                      </a:schemeClr>
+                    </a:gs>
+                  </a:gsLst>
+                  <a:lin ang="5400000"/>
+                </a:gradFill>
+                <a:effectLst>
+                  <a:outerShdw blurRad="80000" dist="40000" dir="5040000" algn="tl">
+                    <a:srgbClr val="000000">
+                      <a:alpha val="30000"/>
+                    </a:srgbClr>
+                  </a:outerShdw>
+                </a:effectLst>
+              </a:rPr>
+              <a:t>生异形啊哥俩</a:t>
+            </a:r>
+            <a:endParaRPr lang="zh-CN" altLang="en-US" sz="5400" b="1" cap="none" spc="0" dirty="0">
+              <a:ln w="11430"/>
+              <a:gradFill>
+                <a:gsLst>
+                  <a:gs pos="0">
+                    <a:schemeClr val="accent6">
+                      <a:tint val="90000"/>
+                      <a:satMod val="120000"/>
+                    </a:schemeClr>
+                  </a:gs>
+                  <a:gs pos="25000">
+                    <a:schemeClr val="accent6">
+                      <a:tint val="93000"/>
+                      <a:satMod val="120000"/>
+                    </a:schemeClr>
+                  </a:gs>
+                  <a:gs pos="50000">
+                    <a:schemeClr val="accent6">
+                      <a:shade val="89000"/>
+                      <a:satMod val="110000"/>
+                    </a:schemeClr>
+                  </a:gs>
+                  <a:gs pos="75000">
+                    <a:schemeClr val="accent6">
+                      <a:tint val="93000"/>
+                      <a:satMod val="120000"/>
+                    </a:schemeClr>
+                  </a:gs>
+                  <a:gs pos="100000">
+                    <a:schemeClr val="accent6">
+                      <a:tint val="90000"/>
+                      <a:satMod val="120000"/>
+                    </a:schemeClr>
+                  </a:gs>
+                </a:gsLst>
+                <a:lin ang="5400000"/>
+              </a:gradFill>
+              <a:effectLst>
+                <a:outerShdw blurRad="80000" dist="40000" dir="5040000" algn="tl">
+                  <a:srgbClr val="000000">
+                    <a:alpha val="30000"/>
+                  </a:srgbClr>
+                </a:outerShdw>
+              </a:effectLst>
+            </a:endParaRPr>
+          </a:p>
+        </p:txBody>
+      </p:sp>
+      <p:sp>
+        <p:nvSpPr>
+          <p:cNvPr id="30" name="矩形 29"/>
+          <p:cNvSpPr/>
+          <p:nvPr/>
+        </p:nvSpPr>
+        <p:spPr>
+          <a:xfrm>
+            <a:off x="1395077" y="3325890"/>
+            <a:ext cx="6445996" cy="923330"/>
+          </a:xfrm>
+          <a:prstGeom prst="rect">
+            <a:avLst/>
+          </a:prstGeom>
+          <a:noFill/>
+        </p:spPr>
+        <p:txBody>
+          <a:bodyPr wrap="none" lIns="91440" tIns="45720" rIns="91440" bIns="45720">
+            <a:spAutoFit/>
+            <a:scene3d>
+              <a:camera prst="orthographicFront"/>
+              <a:lightRig rig="glow" dir="tl">
+                <a:rot lat="0" lon="0" rev="5400000"/>
+              </a:lightRig>
+            </a:scene3d>
+            <a:sp3d contourW="12700">
+              <a:bevelT w="25400" h="25400"/>
+              <a:contourClr>
+                <a:schemeClr val="accent6">
+                  <a:shade val="73000"/>
+                </a:schemeClr>
+              </a:contourClr>
+            </a:sp3d>
+          </a:bodyPr>
+          <a:lstStyle/>
+          <a:p>
+            <a:pPr algn="ctr"/>
+            <a:r>
+              <a:rPr lang="zh-CN" altLang="en-US" sz="5400" b="1" cap="none" spc="0" dirty="0" smtClean="0">
+                <a:ln w="11430"/>
+                <a:gradFill>
+                  <a:gsLst>
+                    <a:gs pos="0">
+                      <a:schemeClr val="accent6">
+                        <a:tint val="90000"/>
+                        <a:satMod val="120000"/>
+                      </a:schemeClr>
+                    </a:gs>
+                    <a:gs pos="25000">
+                      <a:schemeClr val="accent6">
+                        <a:tint val="93000"/>
+                        <a:satMod val="120000"/>
+                      </a:schemeClr>
+                    </a:gs>
+                    <a:gs pos="50000">
+                      <a:schemeClr val="accent6">
+                        <a:shade val="89000"/>
+                        <a:satMod val="110000"/>
+                      </a:schemeClr>
+                    </a:gs>
+                    <a:gs pos="75000">
+                      <a:schemeClr val="accent6">
+                        <a:tint val="93000"/>
+                        <a:satMod val="120000"/>
+                      </a:schemeClr>
+                    </a:gs>
+                    <a:gs pos="100000">
+                      <a:schemeClr val="accent6">
+                        <a:tint val="90000"/>
+                        <a:satMod val="120000"/>
+                      </a:schemeClr>
+                    </a:gs>
+                  </a:gsLst>
+                  <a:lin ang="5400000"/>
+                </a:gradFill>
+                <a:effectLst>
+                  <a:outerShdw blurRad="80000" dist="40000" dir="5040000" algn="tl">
+                    <a:srgbClr val="000000">
+                      <a:alpha val="30000"/>
+                    </a:srgbClr>
+                  </a:outerShdw>
+                </a:effectLst>
+              </a:rPr>
+              <a:t>你这瓜多少钱一斤啊</a:t>
+            </a:r>
+            <a:endParaRPr lang="zh-CN" altLang="en-US" sz="5400" b="1" cap="none" spc="0" dirty="0">
+              <a:ln w="11430"/>
+              <a:gradFill>
+                <a:gsLst>
+                  <a:gs pos="0">
+                    <a:schemeClr val="accent6">
+                      <a:tint val="90000"/>
+                      <a:satMod val="120000"/>
+                    </a:schemeClr>
+                  </a:gs>
+                  <a:gs pos="25000">
+                    <a:schemeClr val="accent6">
+                      <a:tint val="93000"/>
+                      <a:satMod val="120000"/>
+                    </a:schemeClr>
+                  </a:gs>
+                  <a:gs pos="50000">
+                    <a:schemeClr val="accent6">
+                      <a:shade val="89000"/>
+                      <a:satMod val="110000"/>
+                    </a:schemeClr>
+                  </a:gs>
+                  <a:gs pos="75000">
+                    <a:schemeClr val="accent6">
+                      <a:tint val="93000"/>
+                      <a:satMod val="120000"/>
+                    </a:schemeClr>
+                  </a:gs>
+                  <a:gs pos="100000">
+                    <a:schemeClr val="accent6">
+                      <a:tint val="90000"/>
+                      <a:satMod val="120000"/>
+                    </a:schemeClr>
+                  </a:gs>
+                </a:gsLst>
+                <a:lin ang="5400000"/>
+              </a:gradFill>
+              <a:effectLst>
+                <a:outerShdw blurRad="80000" dist="40000" dir="5040000" algn="tl">
+                  <a:srgbClr val="000000">
+                    <a:alpha val="30000"/>
+                  </a:srgbClr>
+                </a:outerShdw>
+              </a:effectLst>
+            </a:endParaRPr>
+          </a:p>
+        </p:txBody>
+      </p:sp>
+      <p:sp>
+        <p:nvSpPr>
+          <p:cNvPr id="31" name="矩形 30"/>
+          <p:cNvSpPr/>
+          <p:nvPr/>
+        </p:nvSpPr>
+        <p:spPr>
+          <a:xfrm>
+            <a:off x="1736908" y="3412210"/>
+            <a:ext cx="5743881" cy="923330"/>
+          </a:xfrm>
+          <a:prstGeom prst="rect">
+            <a:avLst/>
+          </a:prstGeom>
+          <a:noFill/>
+        </p:spPr>
+        <p:txBody>
+          <a:bodyPr wrap="none" lIns="91440" tIns="45720" rIns="91440" bIns="45720">
+            <a:spAutoFit/>
+            <a:scene3d>
+              <a:camera prst="orthographicFront"/>
+              <a:lightRig rig="glow" dir="tl">
+                <a:rot lat="0" lon="0" rev="5400000"/>
+              </a:lightRig>
+            </a:scene3d>
+            <a:sp3d contourW="12700">
+              <a:bevelT w="25400" h="25400"/>
+              <a:contourClr>
+                <a:schemeClr val="accent6">
+                  <a:shade val="73000"/>
+                </a:schemeClr>
+              </a:contourClr>
+            </a:sp3d>
+          </a:bodyPr>
+          <a:lstStyle/>
+          <a:p>
+            <a:pPr algn="ctr"/>
+            <a:r>
+              <a:rPr lang="zh-CN" altLang="en-US" sz="5400" b="1" cap="none" spc="0" dirty="0" smtClean="0">
+                <a:ln w="11430"/>
+                <a:gradFill>
+                  <a:gsLst>
+                    <a:gs pos="0">
+                      <a:schemeClr val="accent6">
+                        <a:tint val="90000"/>
+                        <a:satMod val="120000"/>
+                      </a:schemeClr>
+                    </a:gs>
+                    <a:gs pos="25000">
+                      <a:schemeClr val="accent6">
+                        <a:tint val="93000"/>
+                        <a:satMod val="120000"/>
+                      </a:schemeClr>
+                    </a:gs>
+                    <a:gs pos="50000">
+                      <a:schemeClr val="accent6">
+                        <a:shade val="89000"/>
+                        <a:satMod val="110000"/>
+                      </a:schemeClr>
+                    </a:gs>
+                    <a:gs pos="75000">
+                      <a:schemeClr val="accent6">
+                        <a:tint val="93000"/>
+                        <a:satMod val="120000"/>
+                      </a:schemeClr>
+                    </a:gs>
+                    <a:gs pos="100000">
+                      <a:schemeClr val="accent6">
+                        <a:tint val="90000"/>
+                        <a:satMod val="120000"/>
+                      </a:schemeClr>
+                    </a:gs>
+                  </a:gsLst>
+                  <a:lin ang="5400000"/>
+                </a:gradFill>
+                <a:effectLst>
+                  <a:outerShdw blurRad="80000" dist="40000" dir="5040000" algn="tl">
+                    <a:srgbClr val="000000">
+                      <a:alpha val="30000"/>
+                    </a:srgbClr>
+                  </a:outerShdw>
+                </a:effectLst>
+              </a:rPr>
+              <a:t>你</a:t>
+            </a:r>
+            <a:r>
+              <a:rPr lang="zh-CN" altLang="en-US" sz="5400" b="1" dirty="0" smtClean="0">
+                <a:ln w="11430"/>
+                <a:gradFill>
+                  <a:gsLst>
+                    <a:gs pos="0">
+                      <a:schemeClr val="accent6">
+                        <a:tint val="90000"/>
+                        <a:satMod val="120000"/>
+                      </a:schemeClr>
+                    </a:gs>
+                    <a:gs pos="25000">
+                      <a:schemeClr val="accent6">
+                        <a:tint val="93000"/>
+                        <a:satMod val="120000"/>
+                      </a:schemeClr>
+                    </a:gs>
+                    <a:gs pos="50000">
+                      <a:schemeClr val="accent6">
+                        <a:shade val="89000"/>
+                        <a:satMod val="110000"/>
+                      </a:schemeClr>
+                    </a:gs>
+                    <a:gs pos="75000">
+                      <a:schemeClr val="accent6">
+                        <a:tint val="93000"/>
+                        <a:satMod val="120000"/>
+                      </a:schemeClr>
+                    </a:gs>
+                    <a:gs pos="100000">
+                      <a:schemeClr val="accent6">
+                        <a:tint val="90000"/>
+                        <a:satMod val="120000"/>
+                      </a:schemeClr>
+                    </a:gs>
+                  </a:gsLst>
+                  <a:lin ang="5400000"/>
+                </a:gradFill>
+                <a:effectLst>
+                  <a:outerShdw blurRad="80000" dist="40000" dir="5040000" algn="tl">
+                    <a:srgbClr val="000000">
+                      <a:alpha val="30000"/>
+                    </a:srgbClr>
+                  </a:outerShdw>
+                </a:effectLst>
+              </a:rPr>
+              <a:t>**故意找猹是吧</a:t>
+            </a:r>
+            <a:endParaRPr lang="zh-CN" altLang="en-US" sz="5400" b="1" cap="none" spc="0" dirty="0">
+              <a:ln w="11430"/>
+              <a:gradFill>
+                <a:gsLst>
+                  <a:gs pos="0">
+                    <a:schemeClr val="accent6">
+                      <a:tint val="90000"/>
+                      <a:satMod val="120000"/>
+                    </a:schemeClr>
+                  </a:gs>
+                  <a:gs pos="25000">
+                    <a:schemeClr val="accent6">
+                      <a:tint val="93000"/>
+                      <a:satMod val="120000"/>
+                    </a:schemeClr>
+                  </a:gs>
+                  <a:gs pos="50000">
+                    <a:schemeClr val="accent6">
+                      <a:shade val="89000"/>
+                      <a:satMod val="110000"/>
+                    </a:schemeClr>
+                  </a:gs>
+                  <a:gs pos="75000">
+                    <a:schemeClr val="accent6">
+                      <a:tint val="93000"/>
+                      <a:satMod val="120000"/>
+                    </a:schemeClr>
+                  </a:gs>
+                  <a:gs pos="100000">
+                    <a:schemeClr val="accent6">
+                      <a:tint val="90000"/>
+                      <a:satMod val="120000"/>
+                    </a:schemeClr>
+                  </a:gs>
+                </a:gsLst>
+                <a:lin ang="5400000"/>
+              </a:gradFill>
+              <a:effectLst>
+                <a:outerShdw blurRad="80000" dist="40000" dir="5040000" algn="tl">
+                  <a:srgbClr val="000000">
+                    <a:alpha val="30000"/>
+                  </a:srgbClr>
+                </a:outerShdw>
+              </a:effectLst>
+            </a:endParaRPr>
+          </a:p>
+        </p:txBody>
+      </p:sp>
+      <p:sp>
+        <p:nvSpPr>
+          <p:cNvPr id="32" name="矩形 31"/>
+          <p:cNvSpPr/>
+          <p:nvPr/>
+        </p:nvSpPr>
+        <p:spPr>
+          <a:xfrm>
+            <a:off x="2426200" y="2813726"/>
+            <a:ext cx="5054589" cy="1754326"/>
+          </a:xfrm>
+          <a:prstGeom prst="rect">
+            <a:avLst/>
+          </a:prstGeom>
+          <a:noFill/>
+        </p:spPr>
+        <p:txBody>
+          <a:bodyPr wrap="none" lIns="91440" tIns="45720" rIns="91440" bIns="45720">
+            <a:spAutoFit/>
+            <a:scene3d>
+              <a:camera prst="orthographicFront"/>
+              <a:lightRig rig="glow" dir="tl">
+                <a:rot lat="0" lon="0" rev="5400000"/>
+              </a:lightRig>
+            </a:scene3d>
+            <a:sp3d contourW="12700">
+              <a:bevelT w="25400" h="25400"/>
+              <a:contourClr>
+                <a:schemeClr val="accent6">
+                  <a:shade val="73000"/>
+                </a:schemeClr>
+              </a:contourClr>
+            </a:sp3d>
+          </a:bodyPr>
+          <a:lstStyle/>
+          <a:p>
+            <a:pPr algn="ctr"/>
+            <a:r>
+              <a:rPr lang="zh-CN" altLang="en-US" sz="5400" b="1" cap="none" spc="0" dirty="0" smtClean="0">
+                <a:ln w="11430"/>
+                <a:gradFill>
+                  <a:gsLst>
+                    <a:gs pos="0">
+                      <a:schemeClr val="accent6">
+                        <a:tint val="90000"/>
+                        <a:satMod val="120000"/>
+                      </a:schemeClr>
+                    </a:gs>
+                    <a:gs pos="25000">
+                      <a:schemeClr val="accent6">
+                        <a:tint val="93000"/>
+                        <a:satMod val="120000"/>
+                      </a:schemeClr>
+                    </a:gs>
+                    <a:gs pos="50000">
+                      <a:schemeClr val="accent6">
+                        <a:shade val="89000"/>
+                        <a:satMod val="110000"/>
+                      </a:schemeClr>
+                    </a:gs>
+                    <a:gs pos="75000">
+                      <a:schemeClr val="accent6">
+                        <a:tint val="93000"/>
+                        <a:satMod val="120000"/>
+                      </a:schemeClr>
+                    </a:gs>
+                    <a:gs pos="100000">
+                      <a:schemeClr val="accent6">
+                        <a:tint val="90000"/>
+                        <a:satMod val="120000"/>
+                      </a:schemeClr>
+                    </a:gs>
+                  </a:gsLst>
+                  <a:lin ang="5400000"/>
+                </a:gradFill>
+                <a:effectLst>
+                  <a:outerShdw blurRad="80000" dist="40000" dir="5040000" algn="tl">
+                    <a:srgbClr val="000000">
+                      <a:alpha val="30000"/>
+                    </a:srgbClr>
+                  </a:outerShdw>
+                </a:effectLst>
+              </a:rPr>
+              <a:t>我一开水果摊的</a:t>
+            </a:r>
+            <a:endParaRPr lang="en-US" altLang="zh-CN" sz="5400" b="1" cap="none" spc="0" dirty="0" smtClean="0">
+              <a:ln w="11430"/>
+              <a:gradFill>
+                <a:gsLst>
+                  <a:gs pos="0">
+                    <a:schemeClr val="accent6">
+                      <a:tint val="90000"/>
+                      <a:satMod val="120000"/>
+                    </a:schemeClr>
+                  </a:gs>
+                  <a:gs pos="25000">
+                    <a:schemeClr val="accent6">
+                      <a:tint val="93000"/>
+                      <a:satMod val="120000"/>
+                    </a:schemeClr>
+                  </a:gs>
+                  <a:gs pos="50000">
+                    <a:schemeClr val="accent6">
+                      <a:shade val="89000"/>
+                      <a:satMod val="110000"/>
+                    </a:schemeClr>
+                  </a:gs>
+                  <a:gs pos="75000">
+                    <a:schemeClr val="accent6">
+                      <a:tint val="93000"/>
+                      <a:satMod val="120000"/>
+                    </a:schemeClr>
+                  </a:gs>
+                  <a:gs pos="100000">
+                    <a:schemeClr val="accent6">
+                      <a:tint val="90000"/>
+                      <a:satMod val="120000"/>
+                    </a:schemeClr>
+                  </a:gs>
+                </a:gsLst>
+                <a:lin ang="5400000"/>
+              </a:gradFill>
+              <a:effectLst>
+                <a:outerShdw blurRad="80000" dist="40000" dir="5040000" algn="tl">
+                  <a:srgbClr val="000000">
+                    <a:alpha val="30000"/>
+                  </a:srgbClr>
+                </a:outerShdw>
+              </a:effectLst>
+            </a:endParaRPr>
+          </a:p>
+          <a:p>
+            <a:pPr algn="ctr"/>
+            <a:r>
+              <a:rPr lang="zh-CN" altLang="en-US" sz="5400" b="1" cap="none" spc="0" dirty="0" smtClean="0">
+                <a:ln w="11430"/>
+                <a:gradFill>
+                  <a:gsLst>
+                    <a:gs pos="0">
+                      <a:schemeClr val="accent6">
+                        <a:tint val="90000"/>
+                        <a:satMod val="120000"/>
+                      </a:schemeClr>
+                    </a:gs>
+                    <a:gs pos="25000">
+                      <a:schemeClr val="accent6">
+                        <a:tint val="93000"/>
+                        <a:satMod val="120000"/>
+                      </a:schemeClr>
+                    </a:gs>
+                    <a:gs pos="50000">
+                      <a:schemeClr val="accent6">
+                        <a:shade val="89000"/>
+                        <a:satMod val="110000"/>
+                      </a:schemeClr>
+                    </a:gs>
+                    <a:gs pos="75000">
+                      <a:schemeClr val="accent6">
+                        <a:tint val="93000"/>
+                        <a:satMod val="120000"/>
+                      </a:schemeClr>
+                    </a:gs>
+                    <a:gs pos="100000">
+                      <a:schemeClr val="accent6">
+                        <a:tint val="90000"/>
+                        <a:satMod val="120000"/>
+                      </a:schemeClr>
+                    </a:gs>
+                  </a:gsLst>
+                  <a:lin ang="5400000"/>
+                </a:gradFill>
+                <a:effectLst>
+                  <a:outerShdw blurRad="80000" dist="40000" dir="5040000" algn="tl">
+                    <a:srgbClr val="000000">
+                      <a:alpha val="30000"/>
+                    </a:srgbClr>
+                  </a:outerShdw>
+                </a:effectLst>
+              </a:rPr>
+              <a:t>能卖你生瓜蛋子</a:t>
+            </a:r>
+            <a:endParaRPr lang="zh-CN" altLang="en-US" sz="5400" b="1" cap="none" spc="0" dirty="0">
+              <a:ln w="11430"/>
+              <a:gradFill>
+                <a:gsLst>
+                  <a:gs pos="0">
+                    <a:schemeClr val="accent6">
+                      <a:tint val="90000"/>
+                      <a:satMod val="120000"/>
+                    </a:schemeClr>
+                  </a:gs>
+                  <a:gs pos="25000">
+                    <a:schemeClr val="accent6">
+                      <a:tint val="93000"/>
+                      <a:satMod val="120000"/>
+                    </a:schemeClr>
+                  </a:gs>
+                  <a:gs pos="50000">
+                    <a:schemeClr val="accent6">
+                      <a:shade val="89000"/>
+                      <a:satMod val="110000"/>
+                    </a:schemeClr>
+                  </a:gs>
+                  <a:gs pos="75000">
+                    <a:schemeClr val="accent6">
+                      <a:tint val="93000"/>
+                      <a:satMod val="120000"/>
+                    </a:schemeClr>
+                  </a:gs>
+                  <a:gs pos="100000">
+                    <a:schemeClr val="accent6">
+                      <a:tint val="90000"/>
+                      <a:satMod val="120000"/>
+                    </a:schemeClr>
+                  </a:gs>
+                </a:gsLst>
+                <a:lin ang="5400000"/>
+              </a:gradFill>
+              <a:effectLst>
+                <a:outerShdw blurRad="80000" dist="40000" dir="5040000" algn="tl">
+                  <a:srgbClr val="000000">
+                    <a:alpha val="30000"/>
+                  </a:srgbClr>
+                </a:outerShdw>
+              </a:effectLst>
+            </a:endParaRPr>
+          </a:p>
+        </p:txBody>
+      </p:sp>
+      <p:sp>
+        <p:nvSpPr>
+          <p:cNvPr id="33" name="矩形 32"/>
+          <p:cNvSpPr/>
+          <p:nvPr/>
+        </p:nvSpPr>
+        <p:spPr>
+          <a:xfrm>
+            <a:off x="2084759" y="3325890"/>
+            <a:ext cx="5048178" cy="923330"/>
+          </a:xfrm>
+          <a:prstGeom prst="rect">
+            <a:avLst/>
+          </a:prstGeom>
+          <a:noFill/>
+        </p:spPr>
+        <p:txBody>
+          <a:bodyPr wrap="none" lIns="91440" tIns="45720" rIns="91440" bIns="45720">
+            <a:spAutoFit/>
+            <a:scene3d>
+              <a:camera prst="orthographicFront"/>
+              <a:lightRig rig="glow" dir="tl">
+                <a:rot lat="0" lon="0" rev="5400000"/>
+              </a:lightRig>
+            </a:scene3d>
+            <a:sp3d contourW="12700">
+              <a:bevelT w="25400" h="25400"/>
+              <a:contourClr>
+                <a:schemeClr val="accent6">
+                  <a:shade val="73000"/>
+                </a:schemeClr>
+              </a:contourClr>
+            </a:sp3d>
+          </a:bodyPr>
+          <a:lstStyle/>
+          <a:p>
+            <a:pPr algn="ctr"/>
+            <a:r>
+              <a:rPr lang="zh-CN" altLang="en-US" sz="5400" b="1" cap="none" spc="0" dirty="0" smtClean="0">
+                <a:ln w="11430"/>
+                <a:gradFill>
+                  <a:gsLst>
+                    <a:gs pos="0">
+                      <a:schemeClr val="accent6">
+                        <a:tint val="90000"/>
+                        <a:satMod val="120000"/>
+                      </a:schemeClr>
+                    </a:gs>
+                    <a:gs pos="25000">
+                      <a:schemeClr val="accent6">
+                        <a:tint val="93000"/>
+                        <a:satMod val="120000"/>
+                      </a:schemeClr>
+                    </a:gs>
+                    <a:gs pos="50000">
+                      <a:schemeClr val="accent6">
+                        <a:shade val="89000"/>
+                        <a:satMod val="110000"/>
+                      </a:schemeClr>
+                    </a:gs>
+                    <a:gs pos="75000">
+                      <a:schemeClr val="accent6">
+                        <a:tint val="93000"/>
+                        <a:satMod val="120000"/>
+                      </a:schemeClr>
+                    </a:gs>
+                    <a:gs pos="100000">
+                      <a:schemeClr val="accent6">
+                        <a:tint val="90000"/>
+                        <a:satMod val="120000"/>
+                      </a:schemeClr>
+                    </a:gs>
+                  </a:gsLst>
+                  <a:lin ang="5400000"/>
+                </a:gradFill>
+                <a:effectLst>
+                  <a:outerShdw blurRad="80000" dist="40000" dir="5040000" algn="tl">
+                    <a:srgbClr val="000000">
+                      <a:alpha val="30000"/>
+                    </a:srgbClr>
+                  </a:outerShdw>
+                </a:effectLst>
+              </a:rPr>
+              <a:t>你**劈我瓜是吧</a:t>
+            </a:r>
+            <a:endParaRPr lang="zh-CN" altLang="en-US" sz="5400" b="1" cap="none" spc="0" dirty="0">
+              <a:ln w="11430"/>
+              <a:gradFill>
+                <a:gsLst>
+                  <a:gs pos="0">
+                    <a:schemeClr val="accent6">
+                      <a:tint val="90000"/>
+                      <a:satMod val="120000"/>
+                    </a:schemeClr>
+                  </a:gs>
+                  <a:gs pos="25000">
+                    <a:schemeClr val="accent6">
+                      <a:tint val="93000"/>
+                      <a:satMod val="120000"/>
+                    </a:schemeClr>
+                  </a:gs>
+                  <a:gs pos="50000">
+                    <a:schemeClr val="accent6">
+                      <a:shade val="89000"/>
+                      <a:satMod val="110000"/>
+                    </a:schemeClr>
+                  </a:gs>
+                  <a:gs pos="75000">
+                    <a:schemeClr val="accent6">
+                      <a:tint val="93000"/>
+                      <a:satMod val="120000"/>
+                    </a:schemeClr>
+                  </a:gs>
+                  <a:gs pos="100000">
+                    <a:schemeClr val="accent6">
+                      <a:tint val="90000"/>
+                      <a:satMod val="120000"/>
+                    </a:schemeClr>
+                  </a:gs>
+                </a:gsLst>
+                <a:lin ang="5400000"/>
+              </a:gradFill>
+              <a:effectLst>
+                <a:outerShdw blurRad="80000" dist="40000" dir="5040000" algn="tl">
+                  <a:srgbClr val="000000">
+                    <a:alpha val="30000"/>
+                  </a:srgbClr>
+                </a:outerShdw>
+              </a:effectLst>
+            </a:endParaRPr>
+          </a:p>
+        </p:txBody>
+      </p:sp>
+      <p:sp>
+        <p:nvSpPr>
+          <p:cNvPr id="34" name="矩形 33"/>
+          <p:cNvSpPr/>
+          <p:nvPr/>
+        </p:nvSpPr>
+        <p:spPr>
+          <a:xfrm>
+            <a:off x="3472960" y="3229224"/>
+            <a:ext cx="2271776" cy="923330"/>
+          </a:xfrm>
+          <a:prstGeom prst="rect">
+            <a:avLst/>
+          </a:prstGeom>
+          <a:noFill/>
+        </p:spPr>
+        <p:txBody>
+          <a:bodyPr wrap="none" lIns="91440" tIns="45720" rIns="91440" bIns="45720">
+            <a:spAutoFit/>
+            <a:scene3d>
+              <a:camera prst="orthographicFront"/>
+              <a:lightRig rig="glow" dir="tl">
+                <a:rot lat="0" lon="0" rev="5400000"/>
+              </a:lightRig>
+            </a:scene3d>
+            <a:sp3d contourW="12700">
+              <a:bevelT w="25400" h="25400"/>
+              <a:contourClr>
+                <a:schemeClr val="accent6">
+                  <a:shade val="73000"/>
+                </a:schemeClr>
+              </a:contourClr>
+            </a:sp3d>
+          </a:bodyPr>
+          <a:lstStyle/>
+          <a:p>
+            <a:pPr algn="ctr"/>
+            <a:r>
+              <a:rPr lang="zh-CN" altLang="en-US" sz="5400" b="1" cap="none" spc="0" dirty="0" smtClean="0">
+                <a:ln w="11430"/>
+                <a:gradFill>
+                  <a:gsLst>
+                    <a:gs pos="0">
+                      <a:schemeClr val="accent6">
+                        <a:tint val="90000"/>
+                        <a:satMod val="120000"/>
+                      </a:schemeClr>
+                    </a:gs>
+                    <a:gs pos="25000">
+                      <a:schemeClr val="accent6">
+                        <a:tint val="93000"/>
+                        <a:satMod val="120000"/>
+                      </a:schemeClr>
+                    </a:gs>
+                    <a:gs pos="50000">
+                      <a:schemeClr val="accent6">
+                        <a:shade val="89000"/>
+                        <a:satMod val="110000"/>
+                      </a:schemeClr>
+                    </a:gs>
+                    <a:gs pos="75000">
+                      <a:schemeClr val="accent6">
+                        <a:tint val="93000"/>
+                        <a:satMod val="120000"/>
+                      </a:schemeClr>
+                    </a:gs>
+                    <a:gs pos="100000">
+                      <a:schemeClr val="accent6">
+                        <a:tint val="90000"/>
+                        <a:satMod val="120000"/>
+                      </a:schemeClr>
+                    </a:gs>
+                  </a:gsLst>
+                  <a:lin ang="5400000"/>
+                </a:gradFill>
+                <a:effectLst>
+                  <a:outerShdw blurRad="80000" dist="40000" dir="5040000" algn="tl">
+                    <a:srgbClr val="000000">
+                      <a:alpha val="30000"/>
+                    </a:srgbClr>
+                  </a:outerShdw>
+                </a:effectLst>
+              </a:rPr>
+              <a:t>撒日朗</a:t>
+            </a:r>
+            <a:endParaRPr lang="zh-CN" altLang="en-US" sz="5400" b="1" cap="none" spc="0" dirty="0">
+              <a:ln w="11430"/>
+              <a:gradFill>
+                <a:gsLst>
+                  <a:gs pos="0">
+                    <a:schemeClr val="accent6">
+                      <a:tint val="90000"/>
+                      <a:satMod val="120000"/>
+                    </a:schemeClr>
+                  </a:gs>
+                  <a:gs pos="25000">
+                    <a:schemeClr val="accent6">
+                      <a:tint val="93000"/>
+                      <a:satMod val="120000"/>
+                    </a:schemeClr>
+                  </a:gs>
+                  <a:gs pos="50000">
+                    <a:schemeClr val="accent6">
+                      <a:shade val="89000"/>
+                      <a:satMod val="110000"/>
+                    </a:schemeClr>
+                  </a:gs>
+                  <a:gs pos="75000">
+                    <a:schemeClr val="accent6">
+                      <a:tint val="93000"/>
+                      <a:satMod val="120000"/>
+                    </a:schemeClr>
+                  </a:gs>
+                  <a:gs pos="100000">
+                    <a:schemeClr val="accent6">
+                      <a:tint val="90000"/>
+                      <a:satMod val="120000"/>
+                    </a:schemeClr>
+                  </a:gs>
+                </a:gsLst>
+                <a:lin ang="5400000"/>
+              </a:gradFill>
+              <a:effectLst>
+                <a:outerShdw blurRad="80000" dist="40000" dir="5040000" algn="tl">
+                  <a:srgbClr val="000000">
+                    <a:alpha val="30000"/>
+                  </a:srgbClr>
+                </a:outerShdw>
+              </a:effectLst>
+            </a:endParaRPr>
+          </a:p>
+        </p:txBody>
+      </p:sp>
+      <p:sp>
+        <p:nvSpPr>
+          <p:cNvPr id="3" name="矩形 2"/>
+          <p:cNvSpPr/>
+          <p:nvPr/>
+        </p:nvSpPr>
+        <p:spPr>
+          <a:xfrm>
+            <a:off x="3346344" y="2967335"/>
+            <a:ext cx="2451313" cy="1446550"/>
+          </a:xfrm>
+          <a:prstGeom prst="rect">
+            <a:avLst/>
+          </a:prstGeom>
+          <a:noFill/>
+        </p:spPr>
+        <p:txBody>
+          <a:bodyPr wrap="none" lIns="91440" tIns="45720" rIns="91440" bIns="45720">
+            <a:spAutoFit/>
+            <a:scene3d>
+              <a:camera prst="orthographicFront">
+                <a:rot lat="0" lon="0" rev="0"/>
+              </a:camera>
+              <a:lightRig rig="glow" dir="t">
+                <a:rot lat="0" lon="0" rev="3600000"/>
+              </a:lightRig>
+            </a:scene3d>
+            <a:sp3d prstMaterial="softEdge">
+              <a:bevelT w="29210" h="16510"/>
+              <a:contourClr>
+                <a:schemeClr val="accent4">
+                  <a:alpha val="95000"/>
+                </a:schemeClr>
+              </a:contourClr>
+            </a:sp3d>
+          </a:bodyPr>
+          <a:lstStyle/>
+          <a:p>
+            <a:pPr algn="ctr"/>
+            <a:r>
+              <a:rPr lang="zh-CN" altLang="en-US" sz="8800" b="1" dirty="0">
+                <a:ln>
+                  <a:prstDash val="solid"/>
+                </a:ln>
+                <a:gradFill rotWithShape="1">
+                  <a:gsLst>
+                    <a:gs pos="0">
+                      <a:schemeClr val="accent4">
+                        <a:tint val="70000"/>
+                        <a:satMod val="200000"/>
+                      </a:schemeClr>
+                    </a:gs>
+                    <a:gs pos="40000">
+                      <a:schemeClr val="accent4">
+                        <a:tint val="90000"/>
+                        <a:satMod val="130000"/>
+                      </a:schemeClr>
+                    </a:gs>
+                    <a:gs pos="50000">
+                      <a:schemeClr val="accent4">
+                        <a:tint val="90000"/>
+                        <a:satMod val="130000"/>
+                      </a:schemeClr>
+                    </a:gs>
+                    <a:gs pos="68000">
+                      <a:schemeClr val="accent4">
+                        <a:tint val="90000"/>
+                        <a:satMod val="130000"/>
+                      </a:schemeClr>
+                    </a:gs>
+                    <a:gs pos="100000">
+                      <a:schemeClr val="accent4">
+                        <a:tint val="70000"/>
+                        <a:satMod val="200000"/>
+                      </a:schemeClr>
+                    </a:gs>
+                  </a:gsLst>
+                  <a:lin ang="5400000"/>
+                </a:gradFill>
+                <a:effectLst>
+                  <a:outerShdw blurRad="88000" dist="50800" dir="5040000" algn="tl">
+                    <a:schemeClr val="accent4">
+                      <a:tint val="80000"/>
+                      <a:satMod val="250000"/>
+                      <a:alpha val="45000"/>
+                    </a:schemeClr>
+                  </a:outerShdw>
+                </a:effectLst>
+                <a:hlinkClick r:id="rId28"/>
+              </a:rPr>
+              <a:t>面</a:t>
+            </a:r>
+            <a:r>
+              <a:rPr lang="zh-CN" altLang="en-US" sz="8800" b="1" dirty="0" smtClean="0">
+                <a:ln>
+                  <a:prstDash val="solid"/>
+                </a:ln>
+                <a:gradFill rotWithShape="1">
+                  <a:gsLst>
+                    <a:gs pos="0">
+                      <a:schemeClr val="accent4">
+                        <a:tint val="70000"/>
+                        <a:satMod val="200000"/>
+                      </a:schemeClr>
+                    </a:gs>
+                    <a:gs pos="40000">
+                      <a:schemeClr val="accent4">
+                        <a:tint val="90000"/>
+                        <a:satMod val="130000"/>
+                      </a:schemeClr>
+                    </a:gs>
+                    <a:gs pos="50000">
+                      <a:schemeClr val="accent4">
+                        <a:tint val="90000"/>
+                        <a:satMod val="130000"/>
+                      </a:schemeClr>
+                    </a:gs>
+                    <a:gs pos="68000">
+                      <a:schemeClr val="accent4">
+                        <a:tint val="90000"/>
+                        <a:satMod val="130000"/>
+                      </a:schemeClr>
+                    </a:gs>
+                    <a:gs pos="100000">
+                      <a:schemeClr val="accent4">
+                        <a:tint val="70000"/>
+                        <a:satMod val="200000"/>
+                      </a:schemeClr>
+                    </a:gs>
+                  </a:gsLst>
+                  <a:lin ang="5400000"/>
+                </a:gradFill>
+                <a:effectLst>
+                  <a:outerShdw blurRad="88000" dist="50800" dir="5040000" algn="tl">
+                    <a:schemeClr val="accent4">
+                      <a:tint val="80000"/>
+                      <a:satMod val="250000"/>
+                      <a:alpha val="45000"/>
+                    </a:schemeClr>
+                  </a:outerShdw>
+                </a:effectLst>
+                <a:hlinkClick r:id="rId28"/>
+              </a:rPr>
+              <a:t>筋</a:t>
+            </a:r>
+            <a:endParaRPr lang="zh-CN" altLang="en-US" sz="8800" b="1" cap="none" spc="0" dirty="0">
+              <a:ln>
+                <a:prstDash val="solid"/>
+              </a:ln>
+              <a:gradFill rotWithShape="1">
+                <a:gsLst>
+                  <a:gs pos="0">
+                    <a:schemeClr val="accent4">
+                      <a:tint val="70000"/>
+                      <a:satMod val="200000"/>
+                    </a:schemeClr>
+                  </a:gs>
+                  <a:gs pos="40000">
+                    <a:schemeClr val="accent4">
+                      <a:tint val="90000"/>
+                      <a:satMod val="130000"/>
+                    </a:schemeClr>
+                  </a:gs>
+                  <a:gs pos="50000">
+                    <a:schemeClr val="accent4">
+                      <a:tint val="90000"/>
+                      <a:satMod val="130000"/>
+                    </a:schemeClr>
+                  </a:gs>
+                  <a:gs pos="68000">
+                    <a:schemeClr val="accent4">
+                      <a:tint val="90000"/>
+                      <a:satMod val="130000"/>
+                    </a:schemeClr>
+                  </a:gs>
+                  <a:gs pos="100000">
+                    <a:schemeClr val="accent4">
+                      <a:tint val="70000"/>
+                      <a:satMod val="200000"/>
+                    </a:schemeClr>
+                  </a:gs>
+                </a:gsLst>
+                <a:lin ang="5400000"/>
+              </a:gradFill>
+              <a:effectLst>
+                <a:outerShdw blurRad="88000" dist="50800" dir="5040000" algn="tl">
+                  <a:schemeClr val="accent4">
+                    <a:tint val="80000"/>
+                    <a:satMod val="250000"/>
+                    <a:alpha val="45000"/>
+                  </a:schemeClr>
+                </a:outerShdw>
+              </a:effectLst>
+            </a:endParaRPr>
+          </a:p>
+        </p:txBody>
+      </p:sp>
+      <p:sp>
+        <p:nvSpPr>
+          <p:cNvPr id="13" name="矩形 12"/>
+          <p:cNvSpPr/>
+          <p:nvPr/>
+        </p:nvSpPr>
+        <p:spPr>
+          <a:xfrm>
+            <a:off x="-85682" y="2967335"/>
+            <a:ext cx="9315372" cy="1446550"/>
+          </a:xfrm>
+          <a:prstGeom prst="rect">
+            <a:avLst/>
+          </a:prstGeom>
+          <a:noFill/>
+        </p:spPr>
+        <p:txBody>
+          <a:bodyPr wrap="none" lIns="91440" tIns="45720" rIns="91440" bIns="45720">
+            <a:spAutoFit/>
+            <a:scene3d>
+              <a:camera prst="orthographicFront">
+                <a:rot lat="0" lon="0" rev="0"/>
+              </a:camera>
+              <a:lightRig rig="glow" dir="t">
+                <a:rot lat="0" lon="0" rev="3600000"/>
+              </a:lightRig>
+            </a:scene3d>
+            <a:sp3d prstMaterial="softEdge">
+              <a:bevelT w="29210" h="16510"/>
+              <a:contourClr>
+                <a:schemeClr val="accent4">
+                  <a:alpha val="95000"/>
+                </a:schemeClr>
+              </a:contourClr>
+            </a:sp3d>
+          </a:bodyPr>
+          <a:lstStyle/>
+          <a:p>
+            <a:pPr algn="ctr"/>
+            <a:r>
+              <a:rPr lang="en-US" altLang="zh-CN" sz="8800" b="1" cap="none" spc="0" dirty="0" smtClean="0">
+                <a:ln>
+                  <a:prstDash val="solid"/>
+                </a:ln>
+                <a:gradFill rotWithShape="1">
+                  <a:gsLst>
+                    <a:gs pos="0">
+                      <a:schemeClr val="accent4">
+                        <a:tint val="70000"/>
+                        <a:satMod val="200000"/>
+                      </a:schemeClr>
+                    </a:gs>
+                    <a:gs pos="40000">
+                      <a:schemeClr val="accent4">
+                        <a:tint val="90000"/>
+                        <a:satMod val="130000"/>
+                      </a:schemeClr>
+                    </a:gs>
+                    <a:gs pos="50000">
+                      <a:schemeClr val="accent4">
+                        <a:tint val="90000"/>
+                        <a:satMod val="130000"/>
+                      </a:schemeClr>
+                    </a:gs>
+                    <a:gs pos="68000">
+                      <a:schemeClr val="accent4">
+                        <a:tint val="90000"/>
+                        <a:satMod val="130000"/>
+                      </a:schemeClr>
+                    </a:gs>
+                    <a:gs pos="100000">
+                      <a:schemeClr val="accent4">
+                        <a:tint val="70000"/>
+                        <a:satMod val="200000"/>
+                      </a:schemeClr>
+                    </a:gs>
+                  </a:gsLst>
+                  <a:lin ang="5400000"/>
+                </a:gradFill>
+                <a:effectLst>
+                  <a:outerShdw blurRad="88000" dist="50800" dir="5040000" algn="tl">
+                    <a:schemeClr val="accent4">
+                      <a:tint val="80000"/>
+                      <a:satMod val="250000"/>
+                      <a:alpha val="45000"/>
+                    </a:schemeClr>
+                  </a:outerShdw>
+                </a:effectLst>
+              </a:rPr>
+              <a:t>Thanks for listening</a:t>
+            </a:r>
+            <a:endParaRPr lang="zh-CN" altLang="en-US" sz="8800" b="1" cap="none" spc="0" dirty="0">
+              <a:ln>
+                <a:prstDash val="solid"/>
+              </a:ln>
+              <a:gradFill rotWithShape="1">
+                <a:gsLst>
+                  <a:gs pos="0">
+                    <a:schemeClr val="accent4">
+                      <a:tint val="70000"/>
+                      <a:satMod val="200000"/>
+                    </a:schemeClr>
+                  </a:gs>
+                  <a:gs pos="40000">
+                    <a:schemeClr val="accent4">
+                      <a:tint val="90000"/>
+                      <a:satMod val="130000"/>
+                    </a:schemeClr>
+                  </a:gs>
+                  <a:gs pos="50000">
+                    <a:schemeClr val="accent4">
+                      <a:tint val="90000"/>
+                      <a:satMod val="130000"/>
+                    </a:schemeClr>
+                  </a:gs>
+                  <a:gs pos="68000">
+                    <a:schemeClr val="accent4">
+                      <a:tint val="90000"/>
+                      <a:satMod val="130000"/>
+                    </a:schemeClr>
+                  </a:gs>
+                  <a:gs pos="100000">
+                    <a:schemeClr val="accent4">
+                      <a:tint val="70000"/>
+                      <a:satMod val="200000"/>
+                    </a:schemeClr>
+                  </a:gs>
+                </a:gsLst>
+                <a:lin ang="5400000"/>
+              </a:gradFill>
+              <a:effectLst>
+                <a:outerShdw blurRad="88000" dist="50800" dir="5040000" algn="tl">
+                  <a:schemeClr val="accent4">
+                    <a:tint val="80000"/>
+                    <a:satMod val="250000"/>
+                    <a:alpha val="45000"/>
+                  </a:schemeClr>
+                </a:outerShdw>
+              </a:effectLst>
+            </a:endParaRPr>
+          </a:p>
+        </p:txBody>
+      </p:sp>
     </p:spTree>
     <p:extLst>
       <p:ext uri="{BB962C8B-B14F-4D97-AF65-F5344CB8AC3E}">
@@ -7330,37 +8612,1237 @@
                             </p:stCondLst>
                             <p:childTnLst>
                               <p:par>
-                                <p:cTn id="185" presetID="53" presetClass="exit" presetSubtype="32" fill="hold" grpId="1" nodeType="clickEffect">
+                                <p:cTn id="185" presetID="2" presetClass="entr" presetSubtype="1" fill="hold" grpId="0" nodeType="clickEffect">
+                                  <p:stCondLst>
+                                    <p:cond delay="0"/>
+                                  </p:stCondLst>
+                                  <p:childTnLst>
+                                    <p:set>
+                                      <p:cBhvr>
+                                        <p:cTn id="186" dur="1" fill="hold">
+                                          <p:stCondLst>
+                                            <p:cond delay="0"/>
+                                          </p:stCondLst>
+                                        </p:cTn>
+                                        <p:tgtEl>
+                                          <p:spTgt spid="2"/>
+                                        </p:tgtEl>
+                                        <p:attrNameLst>
+                                          <p:attrName>style.visibility</p:attrName>
+                                        </p:attrNameLst>
+                                      </p:cBhvr>
+                                      <p:to>
+                                        <p:strVal val="visible"/>
+                                      </p:to>
+                                    </p:set>
+                                    <p:anim calcmode="lin" valueType="num">
+                                      <p:cBhvr additive="base">
+                                        <p:cTn id="187" dur="1750" fill="hold"/>
+                                        <p:tgtEl>
+                                          <p:spTgt spid="2"/>
+                                        </p:tgtEl>
+                                        <p:attrNameLst>
+                                          <p:attrName>ppt_x</p:attrName>
+                                        </p:attrNameLst>
+                                      </p:cBhvr>
+                                      <p:tavLst>
+                                        <p:tav tm="0">
+                                          <p:val>
+                                            <p:strVal val="#ppt_x"/>
+                                          </p:val>
+                                        </p:tav>
+                                        <p:tav tm="100000">
+                                          <p:val>
+                                            <p:strVal val="#ppt_x"/>
+                                          </p:val>
+                                        </p:tav>
+                                      </p:tavLst>
+                                    </p:anim>
+                                    <p:anim calcmode="lin" valueType="num">
+                                      <p:cBhvr additive="base">
+                                        <p:cTn id="188" dur="1750" fill="hold"/>
+                                        <p:tgtEl>
+                                          <p:spTgt spid="2"/>
+                                        </p:tgtEl>
+                                        <p:attrNameLst>
+                                          <p:attrName>ppt_y</p:attrName>
+                                        </p:attrNameLst>
+                                      </p:cBhvr>
+                                      <p:tavLst>
+                                        <p:tav tm="0">
+                                          <p:val>
+                                            <p:strVal val="0-#ppt_h/2"/>
+                                          </p:val>
+                                        </p:tav>
+                                        <p:tav tm="100000">
+                                          <p:val>
+                                            <p:strVal val="#ppt_y"/>
+                                          </p:val>
+                                        </p:tav>
+                                      </p:tavLst>
+                                    </p:anim>
+                                  </p:childTnLst>
+                                </p:cTn>
+                              </p:par>
+                              <p:par>
+                                <p:cTn id="189" presetID="6" presetClass="emph" presetSubtype="0" fill="hold" grpId="1" nodeType="withEffect">
+                                  <p:stCondLst>
+                                    <p:cond delay="0"/>
+                                  </p:stCondLst>
+                                  <p:childTnLst>
+                                    <p:animScale>
+                                      <p:cBhvr>
+                                        <p:cTn id="190" dur="1750" fill="hold"/>
+                                        <p:tgtEl>
+                                          <p:spTgt spid="2"/>
+                                        </p:tgtEl>
+                                      </p:cBhvr>
+                                      <p:by x="150000" y="150000"/>
+                                    </p:animScale>
+                                  </p:childTnLst>
+                                </p:cTn>
+                              </p:par>
+                            </p:childTnLst>
+                          </p:cTn>
+                        </p:par>
+                      </p:childTnLst>
+                    </p:cTn>
+                  </p:par>
+                  <p:par>
+                    <p:cTn id="191" fill="hold">
+                      <p:stCondLst>
+                        <p:cond delay="indefinite"/>
+                      </p:stCondLst>
+                      <p:childTnLst>
+                        <p:par>
+                          <p:cTn id="192" fill="hold">
+                            <p:stCondLst>
+                              <p:cond delay="0"/>
+                            </p:stCondLst>
+                            <p:childTnLst>
+                              <p:par>
+                                <p:cTn id="193" presetID="2" presetClass="exit" presetSubtype="4" fill="hold" grpId="2" nodeType="clickEffect">
                                   <p:stCondLst>
                                     <p:cond delay="0"/>
                                   </p:stCondLst>
                                   <p:childTnLst>
                                     <p:anim calcmode="lin" valueType="num">
-                                      <p:cBhvr>
-                                        <p:cTn id="186" dur="500"/>
-                                        <p:tgtEl>
-                                          <p:spTgt spid="10"/>
-                                        </p:tgtEl>
-                                        <p:attrNameLst>
-                                          <p:attrName>ppt_w</p:attrName>
+                                      <p:cBhvr additive="base">
+                                        <p:cTn id="194" dur="1750"/>
+                                        <p:tgtEl>
+                                          <p:spTgt spid="2"/>
+                                        </p:tgtEl>
+                                        <p:attrNameLst>
+                                          <p:attrName>ppt_x</p:attrName>
                                         </p:attrNameLst>
                                       </p:cBhvr>
                                       <p:tavLst>
                                         <p:tav tm="0">
                                           <p:val>
-                                            <p:strVal val="ppt_w"/>
+                                            <p:strVal val="ppt_x"/>
                                           </p:val>
                                         </p:tav>
                                         <p:tav tm="100000">
                                           <p:val>
-                                            <p:fltVal val="0"/>
+                                            <p:strVal val="ppt_x"/>
                                           </p:val>
                                         </p:tav>
                                       </p:tavLst>
                                     </p:anim>
                                     <p:anim calcmode="lin" valueType="num">
-                                      <p:cBhvr>
-                                        <p:cTn id="187" dur="500"/>
+                                      <p:cBhvr additive="base">
+                                        <p:cTn id="195" dur="1750"/>
+                                        <p:tgtEl>
+                                          <p:spTgt spid="2"/>
+                                        </p:tgtEl>
+                                        <p:attrNameLst>
+                                          <p:attrName>ppt_y</p:attrName>
+                                        </p:attrNameLst>
+                                      </p:cBhvr>
+                                      <p:tavLst>
+                                        <p:tav tm="0">
+                                          <p:val>
+                                            <p:strVal val="ppt_y"/>
+                                          </p:val>
+                                        </p:tav>
+                                        <p:tav tm="100000">
+                                          <p:val>
+                                            <p:strVal val="1+ppt_h/2"/>
+                                          </p:val>
+                                        </p:tav>
+                                      </p:tavLst>
+                                    </p:anim>
+                                    <p:set>
+                                      <p:cBhvr>
+                                        <p:cTn id="196" dur="1" fill="hold">
+                                          <p:stCondLst>
+                                            <p:cond delay="1749"/>
+                                          </p:stCondLst>
+                                        </p:cTn>
+                                        <p:tgtEl>
+                                          <p:spTgt spid="2"/>
+                                        </p:tgtEl>
+                                        <p:attrNameLst>
+                                          <p:attrName>style.visibility</p:attrName>
+                                        </p:attrNameLst>
+                                      </p:cBhvr>
+                                      <p:to>
+                                        <p:strVal val="hidden"/>
+                                      </p:to>
+                                    </p:set>
+                                  </p:childTnLst>
+                                </p:cTn>
+                              </p:par>
+                              <p:par>
+                                <p:cTn id="197" presetID="6" presetClass="emph" presetSubtype="0" fill="hold" grpId="3" nodeType="withEffect">
+                                  <p:stCondLst>
+                                    <p:cond delay="0"/>
+                                  </p:stCondLst>
+                                  <p:childTnLst>
+                                    <p:animScale>
+                                      <p:cBhvr>
+                                        <p:cTn id="198" dur="1750" fill="hold"/>
+                                        <p:tgtEl>
+                                          <p:spTgt spid="2"/>
+                                        </p:tgtEl>
+                                      </p:cBhvr>
+                                      <p:by x="50000" y="50000"/>
+                                    </p:animScale>
+                                  </p:childTnLst>
+                                </p:cTn>
+                              </p:par>
+                              <p:par>
+                                <p:cTn id="199" presetID="2" presetClass="entr" presetSubtype="1" fill="hold" grpId="0" nodeType="withEffect">
+                                  <p:stCondLst>
+                                    <p:cond delay="0"/>
+                                  </p:stCondLst>
+                                  <p:childTnLst>
+                                    <p:set>
+                                      <p:cBhvr>
+                                        <p:cTn id="200" dur="1" fill="hold">
+                                          <p:stCondLst>
+                                            <p:cond delay="0"/>
+                                          </p:stCondLst>
+                                        </p:cTn>
+                                        <p:tgtEl>
+                                          <p:spTgt spid="30"/>
+                                        </p:tgtEl>
+                                        <p:attrNameLst>
+                                          <p:attrName>style.visibility</p:attrName>
+                                        </p:attrNameLst>
+                                      </p:cBhvr>
+                                      <p:to>
+                                        <p:strVal val="visible"/>
+                                      </p:to>
+                                    </p:set>
+                                    <p:anim calcmode="lin" valueType="num">
+                                      <p:cBhvr additive="base">
+                                        <p:cTn id="201" dur="1750" fill="hold"/>
+                                        <p:tgtEl>
+                                          <p:spTgt spid="30"/>
+                                        </p:tgtEl>
+                                        <p:attrNameLst>
+                                          <p:attrName>ppt_x</p:attrName>
+                                        </p:attrNameLst>
+                                      </p:cBhvr>
+                                      <p:tavLst>
+                                        <p:tav tm="0">
+                                          <p:val>
+                                            <p:strVal val="#ppt_x"/>
+                                          </p:val>
+                                        </p:tav>
+                                        <p:tav tm="100000">
+                                          <p:val>
+                                            <p:strVal val="#ppt_x"/>
+                                          </p:val>
+                                        </p:tav>
+                                      </p:tavLst>
+                                    </p:anim>
+                                    <p:anim calcmode="lin" valueType="num">
+                                      <p:cBhvr additive="base">
+                                        <p:cTn id="202" dur="1750" fill="hold"/>
+                                        <p:tgtEl>
+                                          <p:spTgt spid="30"/>
+                                        </p:tgtEl>
+                                        <p:attrNameLst>
+                                          <p:attrName>ppt_y</p:attrName>
+                                        </p:attrNameLst>
+                                      </p:cBhvr>
+                                      <p:tavLst>
+                                        <p:tav tm="0">
+                                          <p:val>
+                                            <p:strVal val="0-#ppt_h/2"/>
+                                          </p:val>
+                                        </p:tav>
+                                        <p:tav tm="100000">
+                                          <p:val>
+                                            <p:strVal val="#ppt_y"/>
+                                          </p:val>
+                                        </p:tav>
+                                      </p:tavLst>
+                                    </p:anim>
+                                  </p:childTnLst>
+                                </p:cTn>
+                              </p:par>
+                              <p:par>
+                                <p:cTn id="203" presetID="6" presetClass="emph" presetSubtype="0" fill="hold" grpId="1" nodeType="withEffect">
+                                  <p:stCondLst>
+                                    <p:cond delay="0"/>
+                                  </p:stCondLst>
+                                  <p:childTnLst>
+                                    <p:animScale>
+                                      <p:cBhvr>
+                                        <p:cTn id="204" dur="1750" fill="hold"/>
+                                        <p:tgtEl>
+                                          <p:spTgt spid="30"/>
+                                        </p:tgtEl>
+                                      </p:cBhvr>
+                                      <p:by x="150000" y="150000"/>
+                                    </p:animScale>
+                                  </p:childTnLst>
+                                </p:cTn>
+                              </p:par>
+                            </p:childTnLst>
+                          </p:cTn>
+                        </p:par>
+                      </p:childTnLst>
+                    </p:cTn>
+                  </p:par>
+                  <p:par>
+                    <p:cTn id="205" fill="hold">
+                      <p:stCondLst>
+                        <p:cond delay="indefinite"/>
+                      </p:stCondLst>
+                      <p:childTnLst>
+                        <p:par>
+                          <p:cTn id="206" fill="hold">
+                            <p:stCondLst>
+                              <p:cond delay="0"/>
+                            </p:stCondLst>
+                            <p:childTnLst>
+                              <p:par>
+                                <p:cTn id="207" presetID="2" presetClass="exit" presetSubtype="4" fill="hold" grpId="2" nodeType="clickEffect">
+                                  <p:stCondLst>
+                                    <p:cond delay="0"/>
+                                  </p:stCondLst>
+                                  <p:childTnLst>
+                                    <p:anim calcmode="lin" valueType="num">
+                                      <p:cBhvr additive="base">
+                                        <p:cTn id="208" dur="1750"/>
+                                        <p:tgtEl>
+                                          <p:spTgt spid="30"/>
+                                        </p:tgtEl>
+                                        <p:attrNameLst>
+                                          <p:attrName>ppt_x</p:attrName>
+                                        </p:attrNameLst>
+                                      </p:cBhvr>
+                                      <p:tavLst>
+                                        <p:tav tm="0">
+                                          <p:val>
+                                            <p:strVal val="ppt_x"/>
+                                          </p:val>
+                                        </p:tav>
+                                        <p:tav tm="100000">
+                                          <p:val>
+                                            <p:strVal val="ppt_x"/>
+                                          </p:val>
+                                        </p:tav>
+                                      </p:tavLst>
+                                    </p:anim>
+                                    <p:anim calcmode="lin" valueType="num">
+                                      <p:cBhvr additive="base">
+                                        <p:cTn id="209" dur="1750"/>
+                                        <p:tgtEl>
+                                          <p:spTgt spid="30"/>
+                                        </p:tgtEl>
+                                        <p:attrNameLst>
+                                          <p:attrName>ppt_y</p:attrName>
+                                        </p:attrNameLst>
+                                      </p:cBhvr>
+                                      <p:tavLst>
+                                        <p:tav tm="0">
+                                          <p:val>
+                                            <p:strVal val="ppt_y"/>
+                                          </p:val>
+                                        </p:tav>
+                                        <p:tav tm="100000">
+                                          <p:val>
+                                            <p:strVal val="1+ppt_h/2"/>
+                                          </p:val>
+                                        </p:tav>
+                                      </p:tavLst>
+                                    </p:anim>
+                                    <p:set>
+                                      <p:cBhvr>
+                                        <p:cTn id="210" dur="1" fill="hold">
+                                          <p:stCondLst>
+                                            <p:cond delay="1749"/>
+                                          </p:stCondLst>
+                                        </p:cTn>
+                                        <p:tgtEl>
+                                          <p:spTgt spid="30"/>
+                                        </p:tgtEl>
+                                        <p:attrNameLst>
+                                          <p:attrName>style.visibility</p:attrName>
+                                        </p:attrNameLst>
+                                      </p:cBhvr>
+                                      <p:to>
+                                        <p:strVal val="hidden"/>
+                                      </p:to>
+                                    </p:set>
+                                  </p:childTnLst>
+                                </p:cTn>
+                              </p:par>
+                              <p:par>
+                                <p:cTn id="211" presetID="6" presetClass="emph" presetSubtype="0" fill="hold" grpId="3" nodeType="withEffect">
+                                  <p:stCondLst>
+                                    <p:cond delay="0"/>
+                                  </p:stCondLst>
+                                  <p:childTnLst>
+                                    <p:animScale>
+                                      <p:cBhvr>
+                                        <p:cTn id="212" dur="1750" fill="hold"/>
+                                        <p:tgtEl>
+                                          <p:spTgt spid="30"/>
+                                        </p:tgtEl>
+                                      </p:cBhvr>
+                                      <p:by x="50000" y="50000"/>
+                                    </p:animScale>
+                                  </p:childTnLst>
+                                </p:cTn>
+                              </p:par>
+                              <p:par>
+                                <p:cTn id="213" presetID="2" presetClass="entr" presetSubtype="1" fill="hold" grpId="0" nodeType="withEffect">
+                                  <p:stCondLst>
+                                    <p:cond delay="0"/>
+                                  </p:stCondLst>
+                                  <p:childTnLst>
+                                    <p:set>
+                                      <p:cBhvr>
+                                        <p:cTn id="214" dur="1" fill="hold">
+                                          <p:stCondLst>
+                                            <p:cond delay="0"/>
+                                          </p:stCondLst>
+                                        </p:cTn>
+                                        <p:tgtEl>
+                                          <p:spTgt spid="31"/>
+                                        </p:tgtEl>
+                                        <p:attrNameLst>
+                                          <p:attrName>style.visibility</p:attrName>
+                                        </p:attrNameLst>
+                                      </p:cBhvr>
+                                      <p:to>
+                                        <p:strVal val="visible"/>
+                                      </p:to>
+                                    </p:set>
+                                    <p:anim calcmode="lin" valueType="num">
+                                      <p:cBhvr additive="base">
+                                        <p:cTn id="215" dur="1750" fill="hold"/>
+                                        <p:tgtEl>
+                                          <p:spTgt spid="31"/>
+                                        </p:tgtEl>
+                                        <p:attrNameLst>
+                                          <p:attrName>ppt_x</p:attrName>
+                                        </p:attrNameLst>
+                                      </p:cBhvr>
+                                      <p:tavLst>
+                                        <p:tav tm="0">
+                                          <p:val>
+                                            <p:strVal val="#ppt_x"/>
+                                          </p:val>
+                                        </p:tav>
+                                        <p:tav tm="100000">
+                                          <p:val>
+                                            <p:strVal val="#ppt_x"/>
+                                          </p:val>
+                                        </p:tav>
+                                      </p:tavLst>
+                                    </p:anim>
+                                    <p:anim calcmode="lin" valueType="num">
+                                      <p:cBhvr additive="base">
+                                        <p:cTn id="216" dur="1750" fill="hold"/>
+                                        <p:tgtEl>
+                                          <p:spTgt spid="31"/>
+                                        </p:tgtEl>
+                                        <p:attrNameLst>
+                                          <p:attrName>ppt_y</p:attrName>
+                                        </p:attrNameLst>
+                                      </p:cBhvr>
+                                      <p:tavLst>
+                                        <p:tav tm="0">
+                                          <p:val>
+                                            <p:strVal val="0-#ppt_h/2"/>
+                                          </p:val>
+                                        </p:tav>
+                                        <p:tav tm="100000">
+                                          <p:val>
+                                            <p:strVal val="#ppt_y"/>
+                                          </p:val>
+                                        </p:tav>
+                                      </p:tavLst>
+                                    </p:anim>
+                                  </p:childTnLst>
+                                </p:cTn>
+                              </p:par>
+                              <p:par>
+                                <p:cTn id="217" presetID="6" presetClass="emph" presetSubtype="0" fill="hold" grpId="1" nodeType="withEffect">
+                                  <p:stCondLst>
+                                    <p:cond delay="0"/>
+                                  </p:stCondLst>
+                                  <p:childTnLst>
+                                    <p:animScale>
+                                      <p:cBhvr>
+                                        <p:cTn id="218" dur="1750" fill="hold"/>
+                                        <p:tgtEl>
+                                          <p:spTgt spid="31"/>
+                                        </p:tgtEl>
+                                      </p:cBhvr>
+                                      <p:by x="150000" y="150000"/>
+                                    </p:animScale>
+                                  </p:childTnLst>
+                                </p:cTn>
+                              </p:par>
+                            </p:childTnLst>
+                          </p:cTn>
+                        </p:par>
+                      </p:childTnLst>
+                    </p:cTn>
+                  </p:par>
+                  <p:par>
+                    <p:cTn id="219" fill="hold">
+                      <p:stCondLst>
+                        <p:cond delay="indefinite"/>
+                      </p:stCondLst>
+                      <p:childTnLst>
+                        <p:par>
+                          <p:cTn id="220" fill="hold">
+                            <p:stCondLst>
+                              <p:cond delay="0"/>
+                            </p:stCondLst>
+                            <p:childTnLst>
+                              <p:par>
+                                <p:cTn id="221" presetID="2" presetClass="exit" presetSubtype="4" fill="hold" grpId="2" nodeType="clickEffect">
+                                  <p:stCondLst>
+                                    <p:cond delay="0"/>
+                                  </p:stCondLst>
+                                  <p:childTnLst>
+                                    <p:anim calcmode="lin" valueType="num">
+                                      <p:cBhvr additive="base">
+                                        <p:cTn id="222" dur="1750"/>
+                                        <p:tgtEl>
+                                          <p:spTgt spid="31"/>
+                                        </p:tgtEl>
+                                        <p:attrNameLst>
+                                          <p:attrName>ppt_x</p:attrName>
+                                        </p:attrNameLst>
+                                      </p:cBhvr>
+                                      <p:tavLst>
+                                        <p:tav tm="0">
+                                          <p:val>
+                                            <p:strVal val="ppt_x"/>
+                                          </p:val>
+                                        </p:tav>
+                                        <p:tav tm="100000">
+                                          <p:val>
+                                            <p:strVal val="ppt_x"/>
+                                          </p:val>
+                                        </p:tav>
+                                      </p:tavLst>
+                                    </p:anim>
+                                    <p:anim calcmode="lin" valueType="num">
+                                      <p:cBhvr additive="base">
+                                        <p:cTn id="223" dur="1750"/>
+                                        <p:tgtEl>
+                                          <p:spTgt spid="31"/>
+                                        </p:tgtEl>
+                                        <p:attrNameLst>
+                                          <p:attrName>ppt_y</p:attrName>
+                                        </p:attrNameLst>
+                                      </p:cBhvr>
+                                      <p:tavLst>
+                                        <p:tav tm="0">
+                                          <p:val>
+                                            <p:strVal val="ppt_y"/>
+                                          </p:val>
+                                        </p:tav>
+                                        <p:tav tm="100000">
+                                          <p:val>
+                                            <p:strVal val="1+ppt_h/2"/>
+                                          </p:val>
+                                        </p:tav>
+                                      </p:tavLst>
+                                    </p:anim>
+                                    <p:set>
+                                      <p:cBhvr>
+                                        <p:cTn id="224" dur="1" fill="hold">
+                                          <p:stCondLst>
+                                            <p:cond delay="1749"/>
+                                          </p:stCondLst>
+                                        </p:cTn>
+                                        <p:tgtEl>
+                                          <p:spTgt spid="31"/>
+                                        </p:tgtEl>
+                                        <p:attrNameLst>
+                                          <p:attrName>style.visibility</p:attrName>
+                                        </p:attrNameLst>
+                                      </p:cBhvr>
+                                      <p:to>
+                                        <p:strVal val="hidden"/>
+                                      </p:to>
+                                    </p:set>
+                                  </p:childTnLst>
+                                </p:cTn>
+                              </p:par>
+                              <p:par>
+                                <p:cTn id="225" presetID="6" presetClass="emph" presetSubtype="0" fill="hold" grpId="3" nodeType="withEffect">
+                                  <p:stCondLst>
+                                    <p:cond delay="0"/>
+                                  </p:stCondLst>
+                                  <p:childTnLst>
+                                    <p:animScale>
+                                      <p:cBhvr>
+                                        <p:cTn id="226" dur="1750" fill="hold"/>
+                                        <p:tgtEl>
+                                          <p:spTgt spid="31"/>
+                                        </p:tgtEl>
+                                      </p:cBhvr>
+                                      <p:by x="50000" y="50000"/>
+                                    </p:animScale>
+                                  </p:childTnLst>
+                                </p:cTn>
+                              </p:par>
+                              <p:par>
+                                <p:cTn id="227" presetID="2" presetClass="entr" presetSubtype="1" fill="hold" grpId="0" nodeType="withEffect">
+                                  <p:stCondLst>
+                                    <p:cond delay="0"/>
+                                  </p:stCondLst>
+                                  <p:childTnLst>
+                                    <p:set>
+                                      <p:cBhvr>
+                                        <p:cTn id="228" dur="1" fill="hold">
+                                          <p:stCondLst>
+                                            <p:cond delay="0"/>
+                                          </p:stCondLst>
+                                        </p:cTn>
+                                        <p:tgtEl>
+                                          <p:spTgt spid="32"/>
+                                        </p:tgtEl>
+                                        <p:attrNameLst>
+                                          <p:attrName>style.visibility</p:attrName>
+                                        </p:attrNameLst>
+                                      </p:cBhvr>
+                                      <p:to>
+                                        <p:strVal val="visible"/>
+                                      </p:to>
+                                    </p:set>
+                                    <p:anim calcmode="lin" valueType="num">
+                                      <p:cBhvr additive="base">
+                                        <p:cTn id="229" dur="1750" fill="hold"/>
+                                        <p:tgtEl>
+                                          <p:spTgt spid="32"/>
+                                        </p:tgtEl>
+                                        <p:attrNameLst>
+                                          <p:attrName>ppt_x</p:attrName>
+                                        </p:attrNameLst>
+                                      </p:cBhvr>
+                                      <p:tavLst>
+                                        <p:tav tm="0">
+                                          <p:val>
+                                            <p:strVal val="#ppt_x"/>
+                                          </p:val>
+                                        </p:tav>
+                                        <p:tav tm="100000">
+                                          <p:val>
+                                            <p:strVal val="#ppt_x"/>
+                                          </p:val>
+                                        </p:tav>
+                                      </p:tavLst>
+                                    </p:anim>
+                                    <p:anim calcmode="lin" valueType="num">
+                                      <p:cBhvr additive="base">
+                                        <p:cTn id="230" dur="1750" fill="hold"/>
+                                        <p:tgtEl>
+                                          <p:spTgt spid="32"/>
+                                        </p:tgtEl>
+                                        <p:attrNameLst>
+                                          <p:attrName>ppt_y</p:attrName>
+                                        </p:attrNameLst>
+                                      </p:cBhvr>
+                                      <p:tavLst>
+                                        <p:tav tm="0">
+                                          <p:val>
+                                            <p:strVal val="0-#ppt_h/2"/>
+                                          </p:val>
+                                        </p:tav>
+                                        <p:tav tm="100000">
+                                          <p:val>
+                                            <p:strVal val="#ppt_y"/>
+                                          </p:val>
+                                        </p:tav>
+                                      </p:tavLst>
+                                    </p:anim>
+                                  </p:childTnLst>
+                                </p:cTn>
+                              </p:par>
+                              <p:par>
+                                <p:cTn id="231" presetID="6" presetClass="emph" presetSubtype="0" fill="hold" grpId="1" nodeType="withEffect">
+                                  <p:stCondLst>
+                                    <p:cond delay="0"/>
+                                  </p:stCondLst>
+                                  <p:childTnLst>
+                                    <p:animScale>
+                                      <p:cBhvr>
+                                        <p:cTn id="232" dur="1750" fill="hold"/>
+                                        <p:tgtEl>
+                                          <p:spTgt spid="32"/>
+                                        </p:tgtEl>
+                                      </p:cBhvr>
+                                      <p:by x="150000" y="150000"/>
+                                    </p:animScale>
+                                  </p:childTnLst>
+                                </p:cTn>
+                              </p:par>
+                            </p:childTnLst>
+                          </p:cTn>
+                        </p:par>
+                      </p:childTnLst>
+                    </p:cTn>
+                  </p:par>
+                  <p:par>
+                    <p:cTn id="233" fill="hold">
+                      <p:stCondLst>
+                        <p:cond delay="indefinite"/>
+                      </p:stCondLst>
+                      <p:childTnLst>
+                        <p:par>
+                          <p:cTn id="234" fill="hold">
+                            <p:stCondLst>
+                              <p:cond delay="0"/>
+                            </p:stCondLst>
+                            <p:childTnLst>
+                              <p:par>
+                                <p:cTn id="235" presetID="2" presetClass="exit" presetSubtype="4" fill="hold" grpId="2" nodeType="clickEffect">
+                                  <p:stCondLst>
+                                    <p:cond delay="0"/>
+                                  </p:stCondLst>
+                                  <p:childTnLst>
+                                    <p:anim calcmode="lin" valueType="num">
+                                      <p:cBhvr additive="base">
+                                        <p:cTn id="236" dur="1750"/>
+                                        <p:tgtEl>
+                                          <p:spTgt spid="32"/>
+                                        </p:tgtEl>
+                                        <p:attrNameLst>
+                                          <p:attrName>ppt_x</p:attrName>
+                                        </p:attrNameLst>
+                                      </p:cBhvr>
+                                      <p:tavLst>
+                                        <p:tav tm="0">
+                                          <p:val>
+                                            <p:strVal val="ppt_x"/>
+                                          </p:val>
+                                        </p:tav>
+                                        <p:tav tm="100000">
+                                          <p:val>
+                                            <p:strVal val="ppt_x"/>
+                                          </p:val>
+                                        </p:tav>
+                                      </p:tavLst>
+                                    </p:anim>
+                                    <p:anim calcmode="lin" valueType="num">
+                                      <p:cBhvr additive="base">
+                                        <p:cTn id="237" dur="1750"/>
+                                        <p:tgtEl>
+                                          <p:spTgt spid="32"/>
+                                        </p:tgtEl>
+                                        <p:attrNameLst>
+                                          <p:attrName>ppt_y</p:attrName>
+                                        </p:attrNameLst>
+                                      </p:cBhvr>
+                                      <p:tavLst>
+                                        <p:tav tm="0">
+                                          <p:val>
+                                            <p:strVal val="ppt_y"/>
+                                          </p:val>
+                                        </p:tav>
+                                        <p:tav tm="100000">
+                                          <p:val>
+                                            <p:strVal val="1+ppt_h/2"/>
+                                          </p:val>
+                                        </p:tav>
+                                      </p:tavLst>
+                                    </p:anim>
+                                    <p:set>
+                                      <p:cBhvr>
+                                        <p:cTn id="238" dur="1" fill="hold">
+                                          <p:stCondLst>
+                                            <p:cond delay="1749"/>
+                                          </p:stCondLst>
+                                        </p:cTn>
+                                        <p:tgtEl>
+                                          <p:spTgt spid="32"/>
+                                        </p:tgtEl>
+                                        <p:attrNameLst>
+                                          <p:attrName>style.visibility</p:attrName>
+                                        </p:attrNameLst>
+                                      </p:cBhvr>
+                                      <p:to>
+                                        <p:strVal val="hidden"/>
+                                      </p:to>
+                                    </p:set>
+                                  </p:childTnLst>
+                                </p:cTn>
+                              </p:par>
+                              <p:par>
+                                <p:cTn id="239" presetID="6" presetClass="emph" presetSubtype="0" fill="hold" grpId="3" nodeType="withEffect">
+                                  <p:stCondLst>
+                                    <p:cond delay="0"/>
+                                  </p:stCondLst>
+                                  <p:childTnLst>
+                                    <p:animScale>
+                                      <p:cBhvr>
+                                        <p:cTn id="240" dur="1750" fill="hold"/>
+                                        <p:tgtEl>
+                                          <p:spTgt spid="32"/>
+                                        </p:tgtEl>
+                                      </p:cBhvr>
+                                      <p:by x="50000" y="50000"/>
+                                    </p:animScale>
+                                  </p:childTnLst>
+                                </p:cTn>
+                              </p:par>
+                              <p:par>
+                                <p:cTn id="241" presetID="2" presetClass="entr" presetSubtype="1" fill="hold" grpId="0" nodeType="withEffect">
+                                  <p:stCondLst>
+                                    <p:cond delay="0"/>
+                                  </p:stCondLst>
+                                  <p:childTnLst>
+                                    <p:set>
+                                      <p:cBhvr>
+                                        <p:cTn id="242" dur="1" fill="hold">
+                                          <p:stCondLst>
+                                            <p:cond delay="0"/>
+                                          </p:stCondLst>
+                                        </p:cTn>
+                                        <p:tgtEl>
+                                          <p:spTgt spid="33"/>
+                                        </p:tgtEl>
+                                        <p:attrNameLst>
+                                          <p:attrName>style.visibility</p:attrName>
+                                        </p:attrNameLst>
+                                      </p:cBhvr>
+                                      <p:to>
+                                        <p:strVal val="visible"/>
+                                      </p:to>
+                                    </p:set>
+                                    <p:anim calcmode="lin" valueType="num">
+                                      <p:cBhvr additive="base">
+                                        <p:cTn id="243" dur="1750" fill="hold"/>
+                                        <p:tgtEl>
+                                          <p:spTgt spid="33"/>
+                                        </p:tgtEl>
+                                        <p:attrNameLst>
+                                          <p:attrName>ppt_x</p:attrName>
+                                        </p:attrNameLst>
+                                      </p:cBhvr>
+                                      <p:tavLst>
+                                        <p:tav tm="0">
+                                          <p:val>
+                                            <p:strVal val="#ppt_x"/>
+                                          </p:val>
+                                        </p:tav>
+                                        <p:tav tm="100000">
+                                          <p:val>
+                                            <p:strVal val="#ppt_x"/>
+                                          </p:val>
+                                        </p:tav>
+                                      </p:tavLst>
+                                    </p:anim>
+                                    <p:anim calcmode="lin" valueType="num">
+                                      <p:cBhvr additive="base">
+                                        <p:cTn id="244" dur="1750" fill="hold"/>
+                                        <p:tgtEl>
+                                          <p:spTgt spid="33"/>
+                                        </p:tgtEl>
+                                        <p:attrNameLst>
+                                          <p:attrName>ppt_y</p:attrName>
+                                        </p:attrNameLst>
+                                      </p:cBhvr>
+                                      <p:tavLst>
+                                        <p:tav tm="0">
+                                          <p:val>
+                                            <p:strVal val="0-#ppt_h/2"/>
+                                          </p:val>
+                                        </p:tav>
+                                        <p:tav tm="100000">
+                                          <p:val>
+                                            <p:strVal val="#ppt_y"/>
+                                          </p:val>
+                                        </p:tav>
+                                      </p:tavLst>
+                                    </p:anim>
+                                  </p:childTnLst>
+                                </p:cTn>
+                              </p:par>
+                              <p:par>
+                                <p:cTn id="245" presetID="6" presetClass="emph" presetSubtype="0" fill="hold" grpId="1" nodeType="withEffect">
+                                  <p:stCondLst>
+                                    <p:cond delay="0"/>
+                                  </p:stCondLst>
+                                  <p:childTnLst>
+                                    <p:animScale>
+                                      <p:cBhvr>
+                                        <p:cTn id="246" dur="1750" fill="hold"/>
+                                        <p:tgtEl>
+                                          <p:spTgt spid="33"/>
+                                        </p:tgtEl>
+                                      </p:cBhvr>
+                                      <p:by x="150000" y="150000"/>
+                                    </p:animScale>
+                                  </p:childTnLst>
+                                </p:cTn>
+                              </p:par>
+                            </p:childTnLst>
+                          </p:cTn>
+                        </p:par>
+                      </p:childTnLst>
+                    </p:cTn>
+                  </p:par>
+                  <p:par>
+                    <p:cTn id="247" fill="hold">
+                      <p:stCondLst>
+                        <p:cond delay="indefinite"/>
+                      </p:stCondLst>
+                      <p:childTnLst>
+                        <p:par>
+                          <p:cTn id="248" fill="hold">
+                            <p:stCondLst>
+                              <p:cond delay="0"/>
+                            </p:stCondLst>
+                            <p:childTnLst>
+                              <p:par>
+                                <p:cTn id="249" presetID="2" presetClass="exit" presetSubtype="4" fill="hold" grpId="2" nodeType="clickEffect">
+                                  <p:stCondLst>
+                                    <p:cond delay="0"/>
+                                  </p:stCondLst>
+                                  <p:childTnLst>
+                                    <p:anim calcmode="lin" valueType="num">
+                                      <p:cBhvr additive="base">
+                                        <p:cTn id="250" dur="1750"/>
+                                        <p:tgtEl>
+                                          <p:spTgt spid="33"/>
+                                        </p:tgtEl>
+                                        <p:attrNameLst>
+                                          <p:attrName>ppt_x</p:attrName>
+                                        </p:attrNameLst>
+                                      </p:cBhvr>
+                                      <p:tavLst>
+                                        <p:tav tm="0">
+                                          <p:val>
+                                            <p:strVal val="ppt_x"/>
+                                          </p:val>
+                                        </p:tav>
+                                        <p:tav tm="100000">
+                                          <p:val>
+                                            <p:strVal val="ppt_x"/>
+                                          </p:val>
+                                        </p:tav>
+                                      </p:tavLst>
+                                    </p:anim>
+                                    <p:anim calcmode="lin" valueType="num">
+                                      <p:cBhvr additive="base">
+                                        <p:cTn id="251" dur="1750"/>
+                                        <p:tgtEl>
+                                          <p:spTgt spid="33"/>
+                                        </p:tgtEl>
+                                        <p:attrNameLst>
+                                          <p:attrName>ppt_y</p:attrName>
+                                        </p:attrNameLst>
+                                      </p:cBhvr>
+                                      <p:tavLst>
+                                        <p:tav tm="0">
+                                          <p:val>
+                                            <p:strVal val="ppt_y"/>
+                                          </p:val>
+                                        </p:tav>
+                                        <p:tav tm="100000">
+                                          <p:val>
+                                            <p:strVal val="1+ppt_h/2"/>
+                                          </p:val>
+                                        </p:tav>
+                                      </p:tavLst>
+                                    </p:anim>
+                                    <p:set>
+                                      <p:cBhvr>
+                                        <p:cTn id="252" dur="1" fill="hold">
+                                          <p:stCondLst>
+                                            <p:cond delay="1749"/>
+                                          </p:stCondLst>
+                                        </p:cTn>
+                                        <p:tgtEl>
+                                          <p:spTgt spid="33"/>
+                                        </p:tgtEl>
+                                        <p:attrNameLst>
+                                          <p:attrName>style.visibility</p:attrName>
+                                        </p:attrNameLst>
+                                      </p:cBhvr>
+                                      <p:to>
+                                        <p:strVal val="hidden"/>
+                                      </p:to>
+                                    </p:set>
+                                  </p:childTnLst>
+                                </p:cTn>
+                              </p:par>
+                              <p:par>
+                                <p:cTn id="253" presetID="6" presetClass="emph" presetSubtype="0" fill="hold" grpId="3" nodeType="withEffect">
+                                  <p:stCondLst>
+                                    <p:cond delay="0"/>
+                                  </p:stCondLst>
+                                  <p:childTnLst>
+                                    <p:animScale>
+                                      <p:cBhvr>
+                                        <p:cTn id="254" dur="1750" fill="hold"/>
+                                        <p:tgtEl>
+                                          <p:spTgt spid="33"/>
+                                        </p:tgtEl>
+                                      </p:cBhvr>
+                                      <p:by x="50000" y="50000"/>
+                                    </p:animScale>
+                                  </p:childTnLst>
+                                </p:cTn>
+                              </p:par>
+                              <p:par>
+                                <p:cTn id="255" presetID="2" presetClass="entr" presetSubtype="1" fill="hold" grpId="0" nodeType="withEffect">
+                                  <p:stCondLst>
+                                    <p:cond delay="0"/>
+                                  </p:stCondLst>
+                                  <p:childTnLst>
+                                    <p:set>
+                                      <p:cBhvr>
+                                        <p:cTn id="256" dur="1" fill="hold">
+                                          <p:stCondLst>
+                                            <p:cond delay="0"/>
+                                          </p:stCondLst>
+                                        </p:cTn>
+                                        <p:tgtEl>
+                                          <p:spTgt spid="34"/>
+                                        </p:tgtEl>
+                                        <p:attrNameLst>
+                                          <p:attrName>style.visibility</p:attrName>
+                                        </p:attrNameLst>
+                                      </p:cBhvr>
+                                      <p:to>
+                                        <p:strVal val="visible"/>
+                                      </p:to>
+                                    </p:set>
+                                    <p:anim calcmode="lin" valueType="num">
+                                      <p:cBhvr additive="base">
+                                        <p:cTn id="257" dur="1750" fill="hold"/>
+                                        <p:tgtEl>
+                                          <p:spTgt spid="34"/>
+                                        </p:tgtEl>
+                                        <p:attrNameLst>
+                                          <p:attrName>ppt_x</p:attrName>
+                                        </p:attrNameLst>
+                                      </p:cBhvr>
+                                      <p:tavLst>
+                                        <p:tav tm="0">
+                                          <p:val>
+                                            <p:strVal val="#ppt_x"/>
+                                          </p:val>
+                                        </p:tav>
+                                        <p:tav tm="100000">
+                                          <p:val>
+                                            <p:strVal val="#ppt_x"/>
+                                          </p:val>
+                                        </p:tav>
+                                      </p:tavLst>
+                                    </p:anim>
+                                    <p:anim calcmode="lin" valueType="num">
+                                      <p:cBhvr additive="base">
+                                        <p:cTn id="258" dur="1750" fill="hold"/>
+                                        <p:tgtEl>
+                                          <p:spTgt spid="34"/>
+                                        </p:tgtEl>
+                                        <p:attrNameLst>
+                                          <p:attrName>ppt_y</p:attrName>
+                                        </p:attrNameLst>
+                                      </p:cBhvr>
+                                      <p:tavLst>
+                                        <p:tav tm="0">
+                                          <p:val>
+                                            <p:strVal val="0-#ppt_h/2"/>
+                                          </p:val>
+                                        </p:tav>
+                                        <p:tav tm="100000">
+                                          <p:val>
+                                            <p:strVal val="#ppt_y"/>
+                                          </p:val>
+                                        </p:tav>
+                                      </p:tavLst>
+                                    </p:anim>
+                                  </p:childTnLst>
+                                </p:cTn>
+                              </p:par>
+                              <p:par>
+                                <p:cTn id="259" presetID="6" presetClass="emph" presetSubtype="0" fill="hold" grpId="1" nodeType="withEffect">
+                                  <p:stCondLst>
+                                    <p:cond delay="0"/>
+                                  </p:stCondLst>
+                                  <p:childTnLst>
+                                    <p:animScale>
+                                      <p:cBhvr>
+                                        <p:cTn id="260" dur="1750" fill="hold"/>
+                                        <p:tgtEl>
+                                          <p:spTgt spid="34"/>
+                                        </p:tgtEl>
+                                      </p:cBhvr>
+                                      <p:by x="150000" y="150000"/>
+                                    </p:animScale>
+                                  </p:childTnLst>
+                                </p:cTn>
+                              </p:par>
+                            </p:childTnLst>
+                          </p:cTn>
+                        </p:par>
+                      </p:childTnLst>
+                    </p:cTn>
+                  </p:par>
+                  <p:par>
+                    <p:cTn id="261" fill="hold">
+                      <p:stCondLst>
+                        <p:cond delay="indefinite"/>
+                      </p:stCondLst>
+                      <p:childTnLst>
+                        <p:par>
+                          <p:cTn id="262" fill="hold">
+                            <p:stCondLst>
+                              <p:cond delay="0"/>
+                            </p:stCondLst>
+                            <p:childTnLst>
+                              <p:par>
+                                <p:cTn id="263" presetID="2" presetClass="exit" presetSubtype="4" fill="hold" grpId="2" nodeType="clickEffect">
+                                  <p:stCondLst>
+                                    <p:cond delay="0"/>
+                                  </p:stCondLst>
+                                  <p:childTnLst>
+                                    <p:anim calcmode="lin" valueType="num">
+                                      <p:cBhvr additive="base">
+                                        <p:cTn id="264" dur="1750"/>
+                                        <p:tgtEl>
+                                          <p:spTgt spid="34"/>
+                                        </p:tgtEl>
+                                        <p:attrNameLst>
+                                          <p:attrName>ppt_x</p:attrName>
+                                        </p:attrNameLst>
+                                      </p:cBhvr>
+                                      <p:tavLst>
+                                        <p:tav tm="0">
+                                          <p:val>
+                                            <p:strVal val="ppt_x"/>
+                                          </p:val>
+                                        </p:tav>
+                                        <p:tav tm="100000">
+                                          <p:val>
+                                            <p:strVal val="ppt_x"/>
+                                          </p:val>
+                                        </p:tav>
+                                      </p:tavLst>
+                                    </p:anim>
+                                    <p:anim calcmode="lin" valueType="num">
+                                      <p:cBhvr additive="base">
+                                        <p:cTn id="265" dur="1750"/>
+                                        <p:tgtEl>
+                                          <p:spTgt spid="34"/>
+                                        </p:tgtEl>
+                                        <p:attrNameLst>
+                                          <p:attrName>ppt_y</p:attrName>
+                                        </p:attrNameLst>
+                                      </p:cBhvr>
+                                      <p:tavLst>
+                                        <p:tav tm="0">
+                                          <p:val>
+                                            <p:strVal val="ppt_y"/>
+                                          </p:val>
+                                        </p:tav>
+                                        <p:tav tm="100000">
+                                          <p:val>
+                                            <p:strVal val="1+ppt_h/2"/>
+                                          </p:val>
+                                        </p:tav>
+                                      </p:tavLst>
+                                    </p:anim>
+                                    <p:set>
+                                      <p:cBhvr>
+                                        <p:cTn id="266" dur="1" fill="hold">
+                                          <p:stCondLst>
+                                            <p:cond delay="1749"/>
+                                          </p:stCondLst>
+                                        </p:cTn>
+                                        <p:tgtEl>
+                                          <p:spTgt spid="34"/>
+                                        </p:tgtEl>
+                                        <p:attrNameLst>
+                                          <p:attrName>style.visibility</p:attrName>
+                                        </p:attrNameLst>
+                                      </p:cBhvr>
+                                      <p:to>
+                                        <p:strVal val="hidden"/>
+                                      </p:to>
+                                    </p:set>
+                                  </p:childTnLst>
+                                </p:cTn>
+                              </p:par>
+                              <p:par>
+                                <p:cTn id="267" presetID="6" presetClass="emph" presetSubtype="0" fill="hold" grpId="3" nodeType="withEffect">
+                                  <p:stCondLst>
+                                    <p:cond delay="0"/>
+                                  </p:stCondLst>
+                                  <p:childTnLst>
+                                    <p:animScale>
+                                      <p:cBhvr>
+                                        <p:cTn id="268" dur="1750" fill="hold"/>
+                                        <p:tgtEl>
+                                          <p:spTgt spid="34"/>
+                                        </p:tgtEl>
+                                      </p:cBhvr>
+                                      <p:by x="50000" y="50000"/>
+                                    </p:animScale>
+                                  </p:childTnLst>
+                                </p:cTn>
+                              </p:par>
+                              <p:par>
+                                <p:cTn id="269" presetID="53" presetClass="exit" presetSubtype="32" fill="hold" grpId="1" nodeType="withEffect">
+                                  <p:stCondLst>
+                                    <p:cond delay="0"/>
+                                  </p:stCondLst>
+                                  <p:childTnLst>
+                                    <p:anim calcmode="lin" valueType="num">
+                                      <p:cBhvr>
+                                        <p:cTn id="270" dur="500"/>
+                                        <p:tgtEl>
+                                          <p:spTgt spid="10"/>
+                                        </p:tgtEl>
+                                        <p:attrNameLst>
+                                          <p:attrName>ppt_w</p:attrName>
+                                        </p:attrNameLst>
+                                      </p:cBhvr>
+                                      <p:tavLst>
+                                        <p:tav tm="0">
+                                          <p:val>
+                                            <p:strVal val="ppt_w"/>
+                                          </p:val>
+                                        </p:tav>
+                                        <p:tav tm="100000">
+                                          <p:val>
+                                            <p:fltVal val="0"/>
+                                          </p:val>
+                                        </p:tav>
+                                      </p:tavLst>
+                                    </p:anim>
+                                    <p:anim calcmode="lin" valueType="num">
+                                      <p:cBhvr>
+                                        <p:cTn id="271" dur="500"/>
                                         <p:tgtEl>
                                           <p:spTgt spid="10"/>
                                         </p:tgtEl>
@@ -7383,7 +9865,7 @@
                                     </p:anim>
                                     <p:animEffect transition="out" filter="fade">
                                       <p:cBhvr>
-                                        <p:cTn id="188" dur="500"/>
+                                        <p:cTn id="272" dur="500"/>
                                         <p:tgtEl>
                                           <p:spTgt spid="10"/>
                                         </p:tgtEl>
@@ -7391,7 +9873,7 @@
                                     </p:animEffect>
                                     <p:set>
                                       <p:cBhvr>
-                                        <p:cTn id="189" dur="1" fill="hold">
+                                        <p:cTn id="273" dur="1" fill="hold">
                                           <p:stCondLst>
                                             <p:cond delay="499"/>
                                           </p:stCondLst>
@@ -7417,26 +9899,26 @@
                     </p:cTn>
                   </p:par>
                   <p:par>
-                    <p:cTn id="190" fill="hold">
+                    <p:cTn id="274" fill="hold">
                       <p:stCondLst>
                         <p:cond delay="indefinite"/>
                       </p:stCondLst>
                       <p:childTnLst>
                         <p:par>
-                          <p:cTn id="191" fill="hold">
+                          <p:cTn id="275" fill="hold">
                             <p:stCondLst>
                               <p:cond delay="0"/>
                             </p:stCondLst>
                             <p:childTnLst>
                               <p:par>
-                                <p:cTn id="192" presetID="2" presetClass="entr" presetSubtype="4" fill="hold" grpId="0" nodeType="clickEffect">
+                                <p:cTn id="276" presetID="2" presetClass="entr" presetSubtype="4" fill="hold" grpId="0" nodeType="clickEffect">
                                   <p:stCondLst>
                                     <p:cond delay="0"/>
                                   </p:stCondLst>
                                   <p:childTnLst>
                                     <p:set>
                                       <p:cBhvr>
-                                        <p:cTn id="193" dur="1" fill="hold">
+                                        <p:cTn id="277" dur="1" fill="hold">
                                           <p:stCondLst>
                                             <p:cond delay="0"/>
                                           </p:stCondLst>
@@ -7454,7 +9936,7 @@
                                     </p:set>
                                     <p:anim calcmode="lin" valueType="num">
                                       <p:cBhvr additive="base">
-                                        <p:cTn id="194" dur="500" fill="hold"/>
+                                        <p:cTn id="278" dur="500" fill="hold"/>
                                         <p:tgtEl>
                                           <p:spTgt spid="11"/>
                                         </p:tgtEl>
@@ -7477,7 +9959,7 @@
                                     </p:anim>
                                     <p:anim calcmode="lin" valueType="num">
                                       <p:cBhvr additive="base">
-                                        <p:cTn id="195" dur="500" fill="hold"/>
+                                        <p:cTn id="279" dur="500" fill="hold"/>
                                         <p:tgtEl>
                                           <p:spTgt spid="11"/>
                                         </p:tgtEl>
@@ -7508,26 +9990,26 @@
                     </p:cTn>
                   </p:par>
                   <p:par>
-                    <p:cTn id="196" fill="hold">
+                    <p:cTn id="280" fill="hold">
                       <p:stCondLst>
                         <p:cond delay="indefinite"/>
                       </p:stCondLst>
                       <p:childTnLst>
                         <p:par>
-                          <p:cTn id="197" fill="hold">
+                          <p:cTn id="281" fill="hold">
                             <p:stCondLst>
                               <p:cond delay="0"/>
                             </p:stCondLst>
                             <p:childTnLst>
                               <p:par>
-                                <p:cTn id="198" presetID="53" presetClass="exit" presetSubtype="32" fill="hold" grpId="1" nodeType="clickEffect">
+                                <p:cTn id="282" presetID="53" presetClass="exit" presetSubtype="32" fill="hold" grpId="1" nodeType="clickEffect">
                                   <p:stCondLst>
                                     <p:cond delay="0"/>
                                   </p:stCondLst>
                                   <p:childTnLst>
                                     <p:anim calcmode="lin" valueType="num">
                                       <p:cBhvr>
-                                        <p:cTn id="199" dur="500"/>
+                                        <p:cTn id="283" dur="500"/>
                                         <p:tgtEl>
                                           <p:spTgt spid="11"/>
                                         </p:tgtEl>
@@ -7550,7 +10032,7 @@
                                     </p:anim>
                                     <p:anim calcmode="lin" valueType="num">
                                       <p:cBhvr>
-                                        <p:cTn id="200" dur="500"/>
+                                        <p:cTn id="284" dur="500"/>
                                         <p:tgtEl>
                                           <p:spTgt spid="11"/>
                                         </p:tgtEl>
@@ -7573,7 +10055,7 @@
                                     </p:anim>
                                     <p:animEffect transition="out" filter="fade">
                                       <p:cBhvr>
-                                        <p:cTn id="201" dur="500"/>
+                                        <p:cTn id="285" dur="500"/>
                                         <p:tgtEl>
                                           <p:spTgt spid="11"/>
                                         </p:tgtEl>
@@ -7581,7 +10063,7 @@
                                     </p:animEffect>
                                     <p:set>
                                       <p:cBhvr>
-                                        <p:cTn id="202" dur="1" fill="hold">
+                                        <p:cTn id="286" dur="1" fill="hold">
                                           <p:stCondLst>
                                             <p:cond delay="499"/>
                                           </p:stCondLst>
@@ -7607,26 +10089,26 @@
                     </p:cTn>
                   </p:par>
                   <p:par>
-                    <p:cTn id="203" fill="hold">
+                    <p:cTn id="287" fill="hold">
                       <p:stCondLst>
                         <p:cond delay="indefinite"/>
                       </p:stCondLst>
                       <p:childTnLst>
                         <p:par>
-                          <p:cTn id="204" fill="hold">
+                          <p:cTn id="288" fill="hold">
                             <p:stCondLst>
                               <p:cond delay="0"/>
                             </p:stCondLst>
                             <p:childTnLst>
                               <p:par>
-                                <p:cTn id="205" presetID="21" presetClass="entr" presetSubtype="8" fill="hold" nodeType="clickEffect">
+                                <p:cTn id="289" presetID="21" presetClass="entr" presetSubtype="8" fill="hold" nodeType="clickEffect">
                                   <p:stCondLst>
                                     <p:cond delay="0"/>
                                   </p:stCondLst>
                                   <p:childTnLst>
                                     <p:set>
                                       <p:cBhvr>
-                                        <p:cTn id="206" dur="1" fill="hold">
+                                        <p:cTn id="290" dur="1" fill="hold">
                                           <p:stCondLst>
                                             <p:cond delay="0"/>
                                           </p:stCondLst>
@@ -7644,7 +10126,7 @@
                                     </p:set>
                                     <p:animEffect transition="in" filter="wheel(8)">
                                       <p:cBhvr>
-                                        <p:cTn id="207" dur="1000"/>
+                                        <p:cTn id="291" dur="1000"/>
                                         <p:tgtEl>
                                           <p:spTgt spid="1046"/>
                                         </p:tgtEl>
@@ -7660,26 +10142,26 @@
                     </p:cTn>
                   </p:par>
                   <p:par>
-                    <p:cTn id="208" fill="hold">
+                    <p:cTn id="292" fill="hold">
                       <p:stCondLst>
                         <p:cond delay="indefinite"/>
                       </p:stCondLst>
                       <p:childTnLst>
                         <p:par>
-                          <p:cTn id="209" fill="hold">
+                          <p:cTn id="293" fill="hold">
                             <p:stCondLst>
                               <p:cond delay="0"/>
                             </p:stCondLst>
                             <p:childTnLst>
                               <p:par>
-                                <p:cTn id="210" presetID="42" presetClass="entr" presetSubtype="0" fill="hold" grpId="0" nodeType="clickEffect">
+                                <p:cTn id="294" presetID="42" presetClass="entr" presetSubtype="0" fill="hold" grpId="0" nodeType="clickEffect">
                                   <p:stCondLst>
                                     <p:cond delay="0"/>
                                   </p:stCondLst>
                                   <p:childTnLst>
                                     <p:set>
                                       <p:cBhvr>
-                                        <p:cTn id="211" dur="1" fill="hold">
+                                        <p:cTn id="295" dur="1" fill="hold">
                                           <p:stCondLst>
                                             <p:cond delay="0"/>
                                           </p:stCondLst>
@@ -7697,7 +10179,7 @@
                                     </p:set>
                                     <p:animEffect transition="in" filter="fade">
                                       <p:cBhvr>
-                                        <p:cTn id="212" dur="1000"/>
+                                        <p:cTn id="296" dur="1000"/>
                                         <p:tgtEl>
                                           <p:spTgt spid="12"/>
                                         </p:tgtEl>
@@ -7705,7 +10187,7 @@
                                     </p:animEffect>
                                     <p:anim calcmode="lin" valueType="num">
                                       <p:cBhvr>
-                                        <p:cTn id="213" dur="1000" fill="hold"/>
+                                        <p:cTn id="297" dur="1000" fill="hold"/>
                                         <p:tgtEl>
                                           <p:spTgt spid="12"/>
                                         </p:tgtEl>
@@ -7728,7 +10210,7 @@
                                     </p:anim>
                                     <p:anim calcmode="lin" valueType="num">
                                       <p:cBhvr>
-                                        <p:cTn id="214" dur="1000" fill="hold"/>
+                                        <p:cTn id="298" dur="1000" fill="hold"/>
                                         <p:tgtEl>
                                           <p:spTgt spid="12"/>
                                         </p:tgtEl>
@@ -7759,26 +10241,26 @@
                     </p:cTn>
                   </p:par>
                   <p:par>
-                    <p:cTn id="215" fill="hold">
+                    <p:cTn id="299" fill="hold">
                       <p:stCondLst>
                         <p:cond delay="indefinite"/>
                       </p:stCondLst>
                       <p:childTnLst>
                         <p:par>
-                          <p:cTn id="216" fill="hold">
+                          <p:cTn id="300" fill="hold">
                             <p:stCondLst>
                               <p:cond delay="0"/>
                             </p:stCondLst>
                             <p:childTnLst>
                               <p:par>
-                                <p:cTn id="217" presetID="42" presetClass="exit" presetSubtype="0" fill="hold" nodeType="clickEffect">
+                                <p:cTn id="301" presetID="42" presetClass="exit" presetSubtype="0" fill="hold" nodeType="clickEffect">
                                   <p:stCondLst>
                                     <p:cond delay="0"/>
                                   </p:stCondLst>
                                   <p:childTnLst>
                                     <p:animEffect transition="out" filter="fade">
                                       <p:cBhvr>
-                                        <p:cTn id="218" dur="1000"/>
+                                        <p:cTn id="302" dur="1000"/>
                                         <p:tgtEl>
                                           <p:spTgt spid="1046"/>
                                         </p:tgtEl>
@@ -7786,7 +10268,7 @@
                                     </p:animEffect>
                                     <p:anim calcmode="lin" valueType="num">
                                       <p:cBhvr>
-                                        <p:cTn id="219" dur="1000"/>
+                                        <p:cTn id="303" dur="1000"/>
                                         <p:tgtEl>
                                           <p:spTgt spid="1046"/>
                                         </p:tgtEl>
@@ -7809,7 +10291,7 @@
                                     </p:anim>
                                     <p:anim calcmode="lin" valueType="num">
                                       <p:cBhvr>
-                                        <p:cTn id="220" dur="1000"/>
+                                        <p:cTn id="304" dur="1000"/>
                                         <p:tgtEl>
                                           <p:spTgt spid="1046"/>
                                         </p:tgtEl>
@@ -7832,7 +10314,7 @@
                                     </p:anim>
                                     <p:set>
                                       <p:cBhvr>
-                                        <p:cTn id="221" dur="1" fill="hold">
+                                        <p:cTn id="305" dur="1" fill="hold">
                                           <p:stCondLst>
                                             <p:cond delay="999"/>
                                           </p:stCondLst>
@@ -7852,14 +10334,14 @@
                                 </p:cTn>
                               </p:par>
                               <p:par>
-                                <p:cTn id="222" presetID="42" presetClass="exit" presetSubtype="0" fill="hold" grpId="1" nodeType="withEffect">
+                                <p:cTn id="306" presetID="42" presetClass="exit" presetSubtype="0" fill="hold" grpId="1" nodeType="withEffect">
                                   <p:stCondLst>
                                     <p:cond delay="0"/>
                                   </p:stCondLst>
                                   <p:childTnLst>
                                     <p:animEffect transition="out" filter="fade">
                                       <p:cBhvr>
-                                        <p:cTn id="223" dur="1000"/>
+                                        <p:cTn id="307" dur="1000"/>
                                         <p:tgtEl>
                                           <p:spTgt spid="12"/>
                                         </p:tgtEl>
@@ -7867,7 +10349,7 @@
                                     </p:animEffect>
                                     <p:anim calcmode="lin" valueType="num">
                                       <p:cBhvr>
-                                        <p:cTn id="224" dur="1000"/>
+                                        <p:cTn id="308" dur="1000"/>
                                         <p:tgtEl>
                                           <p:spTgt spid="12"/>
                                         </p:tgtEl>
@@ -7890,7 +10372,7 @@
                                     </p:anim>
                                     <p:anim calcmode="lin" valueType="num">
                                       <p:cBhvr>
-                                        <p:cTn id="225" dur="1000"/>
+                                        <p:cTn id="309" dur="1000"/>
                                         <p:tgtEl>
                                           <p:spTgt spid="12"/>
                                         </p:tgtEl>
@@ -7913,7 +10395,7 @@
                                     </p:anim>
                                     <p:set>
                                       <p:cBhvr>
-                                        <p:cTn id="226" dur="1" fill="hold">
+                                        <p:cTn id="310" dur="1" fill="hold">
                                           <p:stCondLst>
                                             <p:cond delay="999"/>
                                           </p:stCondLst>
@@ -7939,26 +10421,26 @@
                     </p:cTn>
                   </p:par>
                   <p:par>
-                    <p:cTn id="227" fill="hold">
+                    <p:cTn id="311" fill="hold">
                       <p:stCondLst>
                         <p:cond delay="indefinite"/>
                       </p:stCondLst>
                       <p:childTnLst>
                         <p:par>
-                          <p:cTn id="228" fill="hold">
+                          <p:cTn id="312" fill="hold">
                             <p:stCondLst>
                               <p:cond delay="0"/>
                             </p:stCondLst>
                             <p:childTnLst>
                               <p:par>
-                                <p:cTn id="229" presetID="16" presetClass="entr" presetSubtype="37" fill="hold" nodeType="clickEffect">
+                                <p:cTn id="313" presetID="16" presetClass="entr" presetSubtype="37" fill="hold" nodeType="clickEffect">
                                   <p:stCondLst>
                                     <p:cond delay="0"/>
                                   </p:stCondLst>
                                   <p:childTnLst>
                                     <p:set>
                                       <p:cBhvr>
-                                        <p:cTn id="230" dur="1" fill="hold">
+                                        <p:cTn id="314" dur="1" fill="hold">
                                           <p:stCondLst>
                                             <p:cond delay="0"/>
                                           </p:stCondLst>
@@ -7976,7 +10458,7 @@
                                     </p:set>
                                     <p:animEffect transition="in" filter="barn(outVertical)">
                                       <p:cBhvr>
-                                        <p:cTn id="231" dur="500"/>
+                                        <p:cTn id="315" dur="500"/>
                                         <p:tgtEl>
                                           <p:spTgt spid="1048"/>
                                         </p:tgtEl>
@@ -7992,26 +10474,26 @@
                     </p:cTn>
                   </p:par>
                   <p:par>
-                    <p:cTn id="232" fill="hold">
+                    <p:cTn id="316" fill="hold">
                       <p:stCondLst>
                         <p:cond delay="indefinite"/>
                       </p:stCondLst>
                       <p:childTnLst>
                         <p:par>
-                          <p:cTn id="233" fill="hold">
+                          <p:cTn id="317" fill="hold">
                             <p:stCondLst>
                               <p:cond delay="0"/>
                             </p:stCondLst>
                             <p:childTnLst>
                               <p:par>
-                                <p:cTn id="234" presetID="16" presetClass="exit" presetSubtype="21" fill="hold" nodeType="clickEffect">
+                                <p:cTn id="318" presetID="16" presetClass="exit" presetSubtype="21" fill="hold" nodeType="clickEffect">
                                   <p:stCondLst>
                                     <p:cond delay="0"/>
                                   </p:stCondLst>
                                   <p:childTnLst>
                                     <p:animEffect transition="out" filter="barn(inVertical)">
                                       <p:cBhvr>
-                                        <p:cTn id="235" dur="500"/>
+                                        <p:cTn id="319" dur="500"/>
                                         <p:tgtEl>
                                           <p:spTgt spid="1048"/>
                                         </p:tgtEl>
@@ -8019,7 +10501,7 @@
                                     </p:animEffect>
                                     <p:set>
                                       <p:cBhvr>
-                                        <p:cTn id="236" dur="1" fill="hold">
+                                        <p:cTn id="320" dur="1" fill="hold">
                                           <p:stCondLst>
                                             <p:cond delay="499"/>
                                           </p:stCondLst>
@@ -8045,26 +10527,26 @@
                     </p:cTn>
                   </p:par>
                   <p:par>
-                    <p:cTn id="237" fill="hold">
+                    <p:cTn id="321" fill="hold">
                       <p:stCondLst>
                         <p:cond delay="indefinite"/>
                       </p:stCondLst>
                       <p:childTnLst>
                         <p:par>
-                          <p:cTn id="238" fill="hold">
+                          <p:cTn id="322" fill="hold">
                             <p:stCondLst>
                               <p:cond delay="0"/>
                             </p:stCondLst>
                             <p:childTnLst>
                               <p:par>
-                                <p:cTn id="239" presetID="47" presetClass="entr" presetSubtype="0" fill="hold" nodeType="clickEffect">
+                                <p:cTn id="323" presetID="47" presetClass="entr" presetSubtype="0" fill="hold" nodeType="clickEffect">
                                   <p:stCondLst>
                                     <p:cond delay="0"/>
                                   </p:stCondLst>
                                   <p:childTnLst>
                                     <p:set>
                                       <p:cBhvr>
-                                        <p:cTn id="240" dur="1" fill="hold">
+                                        <p:cTn id="324" dur="1" fill="hold">
                                           <p:stCondLst>
                                             <p:cond delay="0"/>
                                           </p:stCondLst>
@@ -8082,7 +10564,7 @@
                                     </p:set>
                                     <p:animEffect transition="in" filter="fade">
                                       <p:cBhvr>
-                                        <p:cTn id="241" dur="1000"/>
+                                        <p:cTn id="325" dur="1000"/>
                                         <p:tgtEl>
                                           <p:spTgt spid="1050"/>
                                         </p:tgtEl>
@@ -8090,7 +10572,7 @@
                                     </p:animEffect>
                                     <p:anim calcmode="lin" valueType="num">
                                       <p:cBhvr>
-                                        <p:cTn id="242" dur="1000" fill="hold"/>
+                                        <p:cTn id="326" dur="1000" fill="hold"/>
                                         <p:tgtEl>
                                           <p:spTgt spid="1050"/>
                                         </p:tgtEl>
@@ -8113,7 +10595,7 @@
                                     </p:anim>
                                     <p:anim calcmode="lin" valueType="num">
                                       <p:cBhvr>
-                                        <p:cTn id="243" dur="1000" fill="hold"/>
+                                        <p:cTn id="327" dur="1000" fill="hold"/>
                                         <p:tgtEl>
                                           <p:spTgt spid="1050"/>
                                         </p:tgtEl>
@@ -8144,26 +10626,26 @@
                     </p:cTn>
                   </p:par>
                   <p:par>
-                    <p:cTn id="244" fill="hold">
+                    <p:cTn id="328" fill="hold">
                       <p:stCondLst>
                         <p:cond delay="indefinite"/>
                       </p:stCondLst>
                       <p:childTnLst>
                         <p:par>
-                          <p:cTn id="245" fill="hold">
+                          <p:cTn id="329" fill="hold">
                             <p:stCondLst>
                               <p:cond delay="0"/>
                             </p:stCondLst>
                             <p:childTnLst>
                               <p:par>
-                                <p:cTn id="246" presetID="42" presetClass="exit" presetSubtype="0" fill="hold" nodeType="clickEffect">
+                                <p:cTn id="330" presetID="42" presetClass="exit" presetSubtype="0" fill="hold" nodeType="clickEffect">
                                   <p:stCondLst>
                                     <p:cond delay="0"/>
                                   </p:stCondLst>
                                   <p:childTnLst>
                                     <p:animEffect transition="out" filter="fade">
                                       <p:cBhvr>
-                                        <p:cTn id="247" dur="1000"/>
+                                        <p:cTn id="331" dur="1000"/>
                                         <p:tgtEl>
                                           <p:spTgt spid="1050"/>
                                         </p:tgtEl>
@@ -8171,7 +10653,7 @@
                                     </p:animEffect>
                                     <p:anim calcmode="lin" valueType="num">
                                       <p:cBhvr>
-                                        <p:cTn id="248" dur="1000"/>
+                                        <p:cTn id="332" dur="1000"/>
                                         <p:tgtEl>
                                           <p:spTgt spid="1050"/>
                                         </p:tgtEl>
@@ -8194,7 +10676,7 @@
                                     </p:anim>
                                     <p:anim calcmode="lin" valueType="num">
                                       <p:cBhvr>
-                                        <p:cTn id="249" dur="1000"/>
+                                        <p:cTn id="333" dur="1000"/>
                                         <p:tgtEl>
                                           <p:spTgt spid="1050"/>
                                         </p:tgtEl>
@@ -8217,7 +10699,7 @@
                                     </p:anim>
                                     <p:set>
                                       <p:cBhvr>
-                                        <p:cTn id="250" dur="1" fill="hold">
+                                        <p:cTn id="334" dur="1" fill="hold">
                                           <p:stCondLst>
                                             <p:cond delay="999"/>
                                           </p:stCondLst>
@@ -8243,26 +10725,26 @@
                     </p:cTn>
                   </p:par>
                   <p:par>
-                    <p:cTn id="251" fill="hold">
+                    <p:cTn id="335" fill="hold">
                       <p:stCondLst>
                         <p:cond delay="indefinite"/>
                       </p:stCondLst>
                       <p:childTnLst>
                         <p:par>
-                          <p:cTn id="252" fill="hold">
+                          <p:cTn id="336" fill="hold">
                             <p:stCondLst>
                               <p:cond delay="0"/>
                             </p:stCondLst>
                             <p:childTnLst>
                               <p:par>
-                                <p:cTn id="253" presetID="2" presetClass="entr" presetSubtype="1" fill="hold" nodeType="clickEffect">
+                                <p:cTn id="337" presetID="2" presetClass="entr" presetSubtype="1" fill="hold" nodeType="clickEffect">
                                   <p:stCondLst>
                                     <p:cond delay="0"/>
                                   </p:stCondLst>
                                   <p:childTnLst>
                                     <p:set>
                                       <p:cBhvr>
-                                        <p:cTn id="254" dur="1" fill="hold">
+                                        <p:cTn id="338" dur="1" fill="hold">
                                           <p:stCondLst>
                                             <p:cond delay="0"/>
                                           </p:stCondLst>
@@ -8280,7 +10762,7 @@
                                     </p:set>
                                     <p:anim calcmode="lin" valueType="num">
                                       <p:cBhvr additive="base">
-                                        <p:cTn id="255" dur="500" fill="hold"/>
+                                        <p:cTn id="339" dur="500" fill="hold"/>
                                         <p:tgtEl>
                                           <p:spTgt spid="1052"/>
                                         </p:tgtEl>
@@ -8303,7 +10785,7 @@
                                     </p:anim>
                                     <p:anim calcmode="lin" valueType="num">
                                       <p:cBhvr additive="base">
-                                        <p:cTn id="256" dur="500" fill="hold"/>
+                                        <p:cTn id="340" dur="500" fill="hold"/>
                                         <p:tgtEl>
                                           <p:spTgt spid="1052"/>
                                         </p:tgtEl>
@@ -8334,26 +10816,26 @@
                     </p:cTn>
                   </p:par>
                   <p:par>
-                    <p:cTn id="257" fill="hold">
+                    <p:cTn id="341" fill="hold">
                       <p:stCondLst>
                         <p:cond delay="indefinite"/>
                       </p:stCondLst>
                       <p:childTnLst>
                         <p:par>
-                          <p:cTn id="258" fill="hold">
+                          <p:cTn id="342" fill="hold">
                             <p:stCondLst>
                               <p:cond delay="0"/>
                             </p:stCondLst>
                             <p:childTnLst>
                               <p:par>
-                                <p:cTn id="259" presetID="2" presetClass="exit" presetSubtype="4" fill="hold" nodeType="clickEffect">
+                                <p:cTn id="343" presetID="2" presetClass="exit" presetSubtype="4" fill="hold" nodeType="clickEffect">
                                   <p:stCondLst>
                                     <p:cond delay="0"/>
                                   </p:stCondLst>
                                   <p:childTnLst>
                                     <p:anim calcmode="lin" valueType="num">
                                       <p:cBhvr additive="base">
-                                        <p:cTn id="260" dur="500"/>
+                                        <p:cTn id="344" dur="500"/>
                                         <p:tgtEl>
                                           <p:spTgt spid="1052"/>
                                         </p:tgtEl>
@@ -8376,7 +10858,7 @@
                                     </p:anim>
                                     <p:anim calcmode="lin" valueType="num">
                                       <p:cBhvr additive="base">
-                                        <p:cTn id="261" dur="500"/>
+                                        <p:cTn id="345" dur="500"/>
                                         <p:tgtEl>
                                           <p:spTgt spid="1052"/>
                                         </p:tgtEl>
@@ -8399,7 +10881,7 @@
                                     </p:anim>
                                     <p:set>
                                       <p:cBhvr>
-                                        <p:cTn id="262" dur="1" fill="hold">
+                                        <p:cTn id="346" dur="1" fill="hold">
                                           <p:stCondLst>
                                             <p:cond delay="499"/>
                                           </p:stCondLst>
@@ -8425,26 +10907,26 @@
                     </p:cTn>
                   </p:par>
                   <p:par>
-                    <p:cTn id="263" fill="hold">
+                    <p:cTn id="347" fill="hold">
                       <p:stCondLst>
                         <p:cond delay="indefinite"/>
                       </p:stCondLst>
                       <p:childTnLst>
                         <p:par>
-                          <p:cTn id="264" fill="hold">
+                          <p:cTn id="348" fill="hold">
                             <p:stCondLst>
                               <p:cond delay="0"/>
                             </p:stCondLst>
                             <p:childTnLst>
                               <p:par>
-                                <p:cTn id="265" presetID="2" presetClass="entr" presetSubtype="1" fill="hold" nodeType="clickEffect">
+                                <p:cTn id="349" presetID="2" presetClass="entr" presetSubtype="1" fill="hold" nodeType="clickEffect">
                                   <p:stCondLst>
                                     <p:cond delay="0"/>
                                   </p:stCondLst>
                                   <p:childTnLst>
                                     <p:set>
                                       <p:cBhvr>
-                                        <p:cTn id="266" dur="1" fill="hold">
+                                        <p:cTn id="350" dur="1" fill="hold">
                                           <p:stCondLst>
                                             <p:cond delay="0"/>
                                           </p:stCondLst>
@@ -8462,7 +10944,7 @@
                                     </p:set>
                                     <p:anim calcmode="lin" valueType="num">
                                       <p:cBhvr additive="base">
-                                        <p:cTn id="267" dur="500" fill="hold"/>
+                                        <p:cTn id="351" dur="500" fill="hold"/>
                                         <p:tgtEl>
                                           <p:spTgt spid="1053"/>
                                         </p:tgtEl>
@@ -8485,7 +10967,7 @@
                                     </p:anim>
                                     <p:anim calcmode="lin" valueType="num">
                                       <p:cBhvr additive="base">
-                                        <p:cTn id="268" dur="500" fill="hold"/>
+                                        <p:cTn id="352" dur="500" fill="hold"/>
                                         <p:tgtEl>
                                           <p:spTgt spid="1053"/>
                                         </p:tgtEl>
@@ -8516,26 +10998,26 @@
                     </p:cTn>
                   </p:par>
                   <p:par>
-                    <p:cTn id="269" fill="hold">
+                    <p:cTn id="353" fill="hold">
                       <p:stCondLst>
                         <p:cond delay="indefinite"/>
                       </p:stCondLst>
                       <p:childTnLst>
                         <p:par>
-                          <p:cTn id="270" fill="hold">
+                          <p:cTn id="354" fill="hold">
                             <p:stCondLst>
                               <p:cond delay="0"/>
                             </p:stCondLst>
                             <p:childTnLst>
                               <p:par>
-                                <p:cTn id="271" presetID="2" presetClass="exit" presetSubtype="4" fill="hold" nodeType="clickEffect">
+                                <p:cTn id="355" presetID="2" presetClass="exit" presetSubtype="4" fill="hold" nodeType="clickEffect">
                                   <p:stCondLst>
                                     <p:cond delay="0"/>
                                   </p:stCondLst>
                                   <p:childTnLst>
                                     <p:anim calcmode="lin" valueType="num">
                                       <p:cBhvr additive="base">
-                                        <p:cTn id="272" dur="500"/>
+                                        <p:cTn id="356" dur="500"/>
                                         <p:tgtEl>
                                           <p:spTgt spid="1053"/>
                                         </p:tgtEl>
@@ -8558,7 +11040,7 @@
                                     </p:anim>
                                     <p:anim calcmode="lin" valueType="num">
                                       <p:cBhvr additive="base">
-                                        <p:cTn id="273" dur="500"/>
+                                        <p:cTn id="357" dur="500"/>
                                         <p:tgtEl>
                                           <p:spTgt spid="1053"/>
                                         </p:tgtEl>
@@ -8581,7 +11063,7 @@
                                     </p:anim>
                                     <p:set>
                                       <p:cBhvr>
-                                        <p:cTn id="274" dur="1" fill="hold">
+                                        <p:cTn id="358" dur="1" fill="hold">
                                           <p:stCondLst>
                                             <p:cond delay="499"/>
                                           </p:stCondLst>
@@ -8607,32 +11089,32 @@
                     </p:cTn>
                   </p:par>
                   <p:par>
-                    <p:cTn id="275" fill="hold">
+                    <p:cTn id="359" fill="hold">
                       <p:stCondLst>
                         <p:cond delay="indefinite"/>
                       </p:stCondLst>
                       <p:childTnLst>
                         <p:par>
-                          <p:cTn id="276" fill="hold">
+                          <p:cTn id="360" fill="hold">
                             <p:stCondLst>
                               <p:cond delay="0"/>
                             </p:stCondLst>
                             <p:childTnLst>
                               <p:par>
-                                <p:cTn id="277" presetID="53" presetClass="entr" presetSubtype="16" fill="hold" nodeType="clickEffect">
+                                <p:cTn id="361" presetID="31" presetClass="entr" presetSubtype="0" fill="hold" grpId="0" nodeType="clickEffect">
                                   <p:stCondLst>
                                     <p:cond delay="0"/>
                                   </p:stCondLst>
                                   <p:childTnLst>
                                     <p:set>
                                       <p:cBhvr>
-                                        <p:cTn id="278" dur="1" fill="hold">
+                                        <p:cTn id="362" dur="1" fill="hold">
                                           <p:stCondLst>
                                             <p:cond delay="0"/>
                                           </p:stCondLst>
                                         </p:cTn>
                                         <p:tgtEl>
-                                          <p:spTgt spid="1055"/>
+                                          <p:spTgt spid="3"/>
                                         </p:tgtEl>
                                         <p:attrNameLst>
                                           <p:attrName>style.visibility</p:attrName>
@@ -8644,9 +11126,9 @@
                                     </p:set>
                                     <p:anim calcmode="lin" valueType="num">
                                       <p:cBhvr>
-                                        <p:cTn id="279" dur="500" fill="hold"/>
-                                        <p:tgtEl>
-                                          <p:spTgt spid="1055"/>
+                                        <p:cTn id="363" dur="1000" fill="hold"/>
+                                        <p:tgtEl>
+                                          <p:spTgt spid="3"/>
                                         </p:tgtEl>
                                         <p:attrNameLst>
                                           <p:attrName>ppt_w</p:attrName>
@@ -8667,9 +11149,9 @@
                                     </p:anim>
                                     <p:anim calcmode="lin" valueType="num">
                                       <p:cBhvr>
-                                        <p:cTn id="280" dur="500" fill="hold"/>
-                                        <p:tgtEl>
-                                          <p:spTgt spid="1055"/>
+                                        <p:cTn id="364" dur="1000" fill="hold"/>
+                                        <p:tgtEl>
+                                          <p:spTgt spid="3"/>
                                         </p:tgtEl>
                                         <p:attrNameLst>
                                           <p:attrName>ppt_h</p:attrName>
@@ -8684,15 +11166,38 @@
                                         <p:tav tm="100000">
                                           <p:val>
                                             <p:strVal val="#ppt_h"/>
+                                          </p:val>
+                                        </p:tav>
+                                      </p:tavLst>
+                                    </p:anim>
+                                    <p:anim calcmode="lin" valueType="num">
+                                      <p:cBhvr>
+                                        <p:cTn id="365" dur="1000" fill="hold"/>
+                                        <p:tgtEl>
+                                          <p:spTgt spid="3"/>
+                                        </p:tgtEl>
+                                        <p:attrNameLst>
+                                          <p:attrName>style.rotation</p:attrName>
+                                        </p:attrNameLst>
+                                      </p:cBhvr>
+                                      <p:tavLst>
+                                        <p:tav tm="0">
+                                          <p:val>
+                                            <p:fltVal val="90"/>
+                                          </p:val>
+                                        </p:tav>
+                                        <p:tav tm="100000">
+                                          <p:val>
+                                            <p:fltVal val="0"/>
                                           </p:val>
                                         </p:tav>
                                       </p:tavLst>
                                     </p:anim>
                                     <p:animEffect transition="in" filter="fade">
                                       <p:cBhvr>
-                                        <p:cTn id="281" dur="500"/>
-                                        <p:tgtEl>
-                                          <p:spTgt spid="1055"/>
+                                        <p:cTn id="366" dur="1000"/>
+                                        <p:tgtEl>
+                                          <p:spTgt spid="3"/>
                                         </p:tgtEl>
                                       </p:cBhvr>
                                     </p:animEffect>
@@ -8706,26 +11211,247 @@
                     </p:cTn>
                   </p:par>
                   <p:par>
-                    <p:cTn id="282" fill="hold">
+                    <p:cTn id="367" fill="hold">
                       <p:stCondLst>
                         <p:cond delay="indefinite"/>
                       </p:stCondLst>
                       <p:childTnLst>
                         <p:par>
-                          <p:cTn id="283" fill="hold">
+                          <p:cTn id="368" fill="hold">
                             <p:stCondLst>
                               <p:cond delay="0"/>
                             </p:stCondLst>
                             <p:childTnLst>
                               <p:par>
-                                <p:cTn id="284" presetID="45" presetClass="exit" presetSubtype="0" fill="hold" nodeType="clickEffect">
+                                <p:cTn id="369" presetID="31" presetClass="exit" presetSubtype="0" fill="hold" grpId="1" nodeType="clickEffect">
+                                  <p:stCondLst>
+                                    <p:cond delay="0"/>
+                                  </p:stCondLst>
+                                  <p:childTnLst>
+                                    <p:anim calcmode="lin" valueType="num">
+                                      <p:cBhvr>
+                                        <p:cTn id="370" dur="1000"/>
+                                        <p:tgtEl>
+                                          <p:spTgt spid="3"/>
+                                        </p:tgtEl>
+                                        <p:attrNameLst>
+                                          <p:attrName>ppt_w</p:attrName>
+                                        </p:attrNameLst>
+                                      </p:cBhvr>
+                                      <p:tavLst>
+                                        <p:tav tm="0">
+                                          <p:val>
+                                            <p:strVal val="ppt_w"/>
+                                          </p:val>
+                                        </p:tav>
+                                        <p:tav tm="100000">
+                                          <p:val>
+                                            <p:fltVal val="0"/>
+                                          </p:val>
+                                        </p:tav>
+                                      </p:tavLst>
+                                    </p:anim>
+                                    <p:anim calcmode="lin" valueType="num">
+                                      <p:cBhvr>
+                                        <p:cTn id="371" dur="1000"/>
+                                        <p:tgtEl>
+                                          <p:spTgt spid="3"/>
+                                        </p:tgtEl>
+                                        <p:attrNameLst>
+                                          <p:attrName>ppt_h</p:attrName>
+                                        </p:attrNameLst>
+                                      </p:cBhvr>
+                                      <p:tavLst>
+                                        <p:tav tm="0">
+                                          <p:val>
+                                            <p:strVal val="ppt_h"/>
+                                          </p:val>
+                                        </p:tav>
+                                        <p:tav tm="100000">
+                                          <p:val>
+                                            <p:fltVal val="0"/>
+                                          </p:val>
+                                        </p:tav>
+                                      </p:tavLst>
+                                    </p:anim>
+                                    <p:anim calcmode="lin" valueType="num">
+                                      <p:cBhvr>
+                                        <p:cTn id="372" dur="1000"/>
+                                        <p:tgtEl>
+                                          <p:spTgt spid="3"/>
+                                        </p:tgtEl>
+                                        <p:attrNameLst>
+                                          <p:attrName>style.rotation</p:attrName>
+                                        </p:attrNameLst>
+                                      </p:cBhvr>
+                                      <p:tavLst>
+                                        <p:tav tm="0">
+                                          <p:val>
+                                            <p:fltVal val="0"/>
+                                          </p:val>
+                                        </p:tav>
+                                        <p:tav tm="100000">
+                                          <p:val>
+                                            <p:fltVal val="90"/>
+                                          </p:val>
+                                        </p:tav>
+                                      </p:tavLst>
+                                    </p:anim>
+                                    <p:animEffect transition="out" filter="fade">
+                                      <p:cBhvr>
+                                        <p:cTn id="373" dur="1000"/>
+                                        <p:tgtEl>
+                                          <p:spTgt spid="3"/>
+                                        </p:tgtEl>
+                                      </p:cBhvr>
+                                    </p:animEffect>
+                                    <p:set>
+                                      <p:cBhvr>
+                                        <p:cTn id="374" dur="1" fill="hold">
+                                          <p:stCondLst>
+                                            <p:cond delay="999"/>
+                                          </p:stCondLst>
+                                        </p:cTn>
+                                        <p:tgtEl>
+                                          <p:spTgt spid="3"/>
+                                        </p:tgtEl>
+                                        <p:attrNameLst>
+                                          <p:attrName>style.visibility</p:attrName>
+                                        </p:attrNameLst>
+                                      </p:cBhvr>
+                                      <p:to>
+                                        <p:strVal val="hidden"/>
+                                      </p:to>
+                                    </p:set>
+                                  </p:childTnLst>
+                                </p:cTn>
+                              </p:par>
+                            </p:childTnLst>
+                          </p:cTn>
+                        </p:par>
+                      </p:childTnLst>
+                    </p:cTn>
+                  </p:par>
+                  <p:par>
+                    <p:cTn id="375" fill="hold">
+                      <p:stCondLst>
+                        <p:cond delay="indefinite"/>
+                      </p:stCondLst>
+                      <p:childTnLst>
+                        <p:par>
+                          <p:cTn id="376" fill="hold">
+                            <p:stCondLst>
+                              <p:cond delay="0"/>
+                            </p:stCondLst>
+                            <p:childTnLst>
+                              <p:par>
+                                <p:cTn id="377" presetID="53" presetClass="entr" presetSubtype="16" fill="hold" nodeType="clickEffect">
+                                  <p:stCondLst>
+                                    <p:cond delay="0"/>
+                                  </p:stCondLst>
+                                  <p:childTnLst>
+                                    <p:set>
+                                      <p:cBhvr>
+                                        <p:cTn id="378" dur="1" fill="hold">
+                                          <p:stCondLst>
+                                            <p:cond delay="0"/>
+                                          </p:stCondLst>
+                                        </p:cTn>
+                                        <p:tgtEl>
+                                          <p:spTgt spid="1055"/>
+                                        </p:tgtEl>
+                                        <p:attrNameLst>
+                                          <p:attrName>style.visibility</p:attrName>
+                                        </p:attrNameLst>
+                                      </p:cBhvr>
+                                      <p:to>
+                                        <p:strVal val="visible"/>
+                                      </p:to>
+                                    </p:set>
+                                    <p:anim calcmode="lin" valueType="num">
+                                      <p:cBhvr>
+                                        <p:cTn id="379" dur="500" fill="hold"/>
+                                        <p:tgtEl>
+                                          <p:spTgt spid="1055"/>
+                                        </p:tgtEl>
+                                        <p:attrNameLst>
+                                          <p:attrName>ppt_w</p:attrName>
+                                        </p:attrNameLst>
+                                      </p:cBhvr>
+                                      <p:tavLst>
+                                        <p:tav tm="0">
+                                          <p:val>
+                                            <p:fltVal val="0"/>
+                                          </p:val>
+                                        </p:tav>
+                                        <p:tav tm="100000">
+                                          <p:val>
+                                            <p:strVal val="#ppt_w"/>
+                                          </p:val>
+                                        </p:tav>
+                                      </p:tavLst>
+                                    </p:anim>
+                                    <p:anim calcmode="lin" valueType="num">
+                                      <p:cBhvr>
+                                        <p:cTn id="380" dur="500" fill="hold"/>
+                                        <p:tgtEl>
+                                          <p:spTgt spid="1055"/>
+                                        </p:tgtEl>
+                                        <p:attrNameLst>
+                                          <p:attrName>ppt_h</p:attrName>
+                                        </p:attrNameLst>
+                                      </p:cBhvr>
+                                      <p:tavLst>
+                                        <p:tav tm="0">
+                                          <p:val>
+                                            <p:fltVal val="0"/>
+                                          </p:val>
+                                        </p:tav>
+                                        <p:tav tm="100000">
+                                          <p:val>
+                                            <p:strVal val="#ppt_h"/>
+                                          </p:val>
+                                        </p:tav>
+                                      </p:tavLst>
+                                    </p:anim>
+                                    <p:animEffect transition="in" filter="fade">
+                                      <p:cBhvr>
+                                        <p:cTn id="381" dur="500"/>
+                                        <p:tgtEl>
+                                          <p:spTgt spid="1055"/>
+                                        </p:tgtEl>
+                                      </p:cBhvr>
+                                    </p:animEffect>
+                                  </p:childTnLst>
+                                </p:cTn>
+                              </p:par>
+                            </p:childTnLst>
+                          </p:cTn>
+                        </p:par>
+                      </p:childTnLst>
+                    </p:cTn>
+                  </p:par>
+                  <p:par>
+                    <p:cTn id="382" fill="hold">
+                      <p:stCondLst>
+                        <p:cond delay="indefinite"/>
+                      </p:stCondLst>
+                      <p:childTnLst>
+                        <p:par>
+                          <p:cTn id="383" fill="hold">
+                            <p:stCondLst>
+                              <p:cond delay="0"/>
+                            </p:stCondLst>
+                            <p:childTnLst>
+                              <p:par>
+                                <p:cTn id="384" presetID="45" presetClass="exit" presetSubtype="0" fill="hold" nodeType="clickEffect">
                                   <p:stCondLst>
                                     <p:cond delay="0"/>
                                   </p:stCondLst>
                                   <p:childTnLst>
                                     <p:animEffect transition="out" filter="fade">
                                       <p:cBhvr>
-                                        <p:cTn id="285" dur="5250"/>
+                                        <p:cTn id="385" dur="5250"/>
                                         <p:tgtEl>
                                           <p:spTgt spid="1055"/>
                                         </p:tgtEl>
@@ -8733,7 +11459,7 @@
                                     </p:animEffect>
                                     <p:anim calcmode="lin" valueType="num">
                                       <p:cBhvr>
-                                        <p:cTn id="286" dur="5250"/>
+                                        <p:cTn id="386" dur="5250"/>
                                         <p:tgtEl>
                                           <p:spTgt spid="1055"/>
                                         </p:tgtEl>
@@ -8851,7 +11577,7 @@
                                     </p:anim>
                                     <p:anim calcmode="lin" valueType="num">
                                       <p:cBhvr>
-                                        <p:cTn id="287" dur="5250"/>
+                                        <p:cTn id="387" dur="5250"/>
                                         <p:tgtEl>
                                           <p:spTgt spid="1055"/>
                                         </p:tgtEl>
@@ -8874,7 +11600,7 @@
                                     </p:anim>
                                     <p:set>
                                       <p:cBhvr>
-                                        <p:cTn id="288" dur="1" fill="hold">
+                                        <p:cTn id="388" dur="1" fill="hold">
                                           <p:stCondLst>
                                             <p:cond delay="5249"/>
                                           </p:stCondLst>
@@ -8890,6 +11616,79 @@
                                         <p:strVal val="hidden"/>
                                       </p:to>
                                     </p:set>
+                                  </p:childTnLst>
+                                </p:cTn>
+                              </p:par>
+                              <p:par>
+                                <p:cTn id="389" presetID="2" presetClass="entr" presetSubtype="2" fill="hold" grpId="0" nodeType="withEffect">
+                                  <p:stCondLst>
+                                    <p:cond delay="750"/>
+                                  </p:stCondLst>
+                                  <p:childTnLst>
+                                    <p:set>
+                                      <p:cBhvr>
+                                        <p:cTn id="390" dur="1" fill="hold">
+                                          <p:stCondLst>
+                                            <p:cond delay="0"/>
+                                          </p:stCondLst>
+                                        </p:cTn>
+                                        <p:tgtEl>
+                                          <p:spTgt spid="13"/>
+                                        </p:tgtEl>
+                                        <p:attrNameLst>
+                                          <p:attrName>style.visibility</p:attrName>
+                                        </p:attrNameLst>
+                                      </p:cBhvr>
+                                      <p:to>
+                                        <p:strVal val="visible"/>
+                                      </p:to>
+                                    </p:set>
+                                    <p:anim calcmode="lin" valueType="num">
+                                      <p:cBhvr additive="base">
+                                        <p:cTn id="391" dur="1500" fill="hold"/>
+                                        <p:tgtEl>
+                                          <p:spTgt spid="13"/>
+                                        </p:tgtEl>
+                                        <p:attrNameLst>
+                                          <p:attrName>ppt_x</p:attrName>
+                                        </p:attrNameLst>
+                                      </p:cBhvr>
+                                      <p:tavLst>
+                                        <p:tav tm="0">
+                                          <p:val>
+                                            <p:strVal val="1+#ppt_w/2"/>
+                                          </p:val>
+                                        </p:tav>
+                                        <p:tav tm="100000">
+                                          <p:val>
+                                            <p:strVal val="#ppt_x"/>
+                                          </p:val>
+                                        </p:tav>
+                                      </p:tavLst>
+                                    </p:anim>
+                                    <p:anim calcmode="lin" valueType="num">
+                                      <p:cBhvr additive="base">
+                                        <p:cTn id="392" dur="1500" fill="hold"/>
+                                        <p:tgtEl>
+                                          <p:spTgt spid="13"/>
+                                        </p:tgtEl>
+                                        <p:attrNameLst>
+                                          <p:attrName>ppt_y</p:attrName>
+                                        </p:attrNameLst>
+                                      </p:cBhvr>
+                                      <p:tavLst>
+                                        <p:tav tm="0">
+                                          <p:val>
+                                            <p:strVal val="#ppt_y"/>
+                                          </p:val>
+                                        </p:tav>
+                                        <p:tav tm="100000">
+                                          <p:val>
+                                            <p:strVal val="#ppt_y"/>
+                                          </p:val>
+                                        </p:tav>
+                                      </p:tavLst>
+                                    </p:anim>
                                   </p:childTnLst>
                                 </p:cTn>
                               </p:par>
@@ -8938,6 +11737,33 @@
       <p:bldP spid="11" grpId="1"/>
       <p:bldP spid="12" grpId="0"/>
       <p:bldP spid="12" grpId="1"/>
+      <p:bldP spid="2" grpId="0"/>
+      <p:bldP spid="2" grpId="1"/>
+      <p:bldP spid="2" grpId="2"/>
+      <p:bldP spid="2" grpId="3"/>
+      <p:bldP spid="30" grpId="0"/>
+      <p:bldP spid="30" grpId="1"/>
+      <p:bldP spid="30" grpId="2"/>
+      <p:bldP spid="30" grpId="3"/>
+      <p:bldP spid="31" grpId="0"/>
+      <p:bldP spid="31" grpId="1"/>
+      <p:bldP spid="31" grpId="2"/>
+      <p:bldP spid="31" grpId="3"/>
+      <p:bldP spid="32" grpId="0"/>
+      <p:bldP spid="32" grpId="1"/>
+      <p:bldP spid="32" grpId="2"/>
+      <p:bldP spid="32" grpId="3"/>
+      <p:bldP spid="33" grpId="0"/>
+      <p:bldP spid="33" grpId="1"/>
+      <p:bldP spid="33" grpId="2"/>
+      <p:bldP spid="33" grpId="3"/>
+      <p:bldP spid="34" grpId="0"/>
+      <p:bldP spid="34" grpId="1"/>
+      <p:bldP spid="34" grpId="2"/>
+      <p:bldP spid="34" grpId="3"/>
+      <p:bldP spid="3" grpId="0"/>
+      <p:bldP spid="3" grpId="1"/>
+      <p:bldP spid="13" grpId="0"/>
     </p:bldLst>
   </p:timing>
 </p:sld>

</xml_diff>